<commit_message>
add new on streamlit
</commit_message>
<xml_diff>
--- a/MusicClasiffication.pptx
+++ b/MusicClasiffication.pptx
@@ -5,7 +5,7 @@
     <p:sldMasterId id="2147483648" r:id="rId1"/>
   </p:sldMasterIdLst>
   <p:notesMasterIdLst>
-    <p:notesMasterId r:id="rId12"/>
+    <p:notesMasterId r:id="rId10"/>
   </p:notesMasterIdLst>
   <p:sldIdLst>
     <p:sldId id="256" r:id="rId2"/>
@@ -16,8 +16,6 @@
     <p:sldId id="262" r:id="rId7"/>
     <p:sldId id="264" r:id="rId8"/>
     <p:sldId id="263" r:id="rId9"/>
-    <p:sldId id="266" r:id="rId10"/>
-    <p:sldId id="259" r:id="rId11"/>
   </p:sldIdLst>
   <p:sldSz cx="12192000" cy="6858000"/>
   <p:notesSz cx="6858000" cy="9144000"/>
@@ -3466,757 +3464,6 @@
 </dgm:colorsDef>
 </file>
 
-<file path=ppt/diagrams/colors4.xml><?xml version="1.0" encoding="utf-8"?>
-<dgm:colorsDef xmlns:dgm="http://schemas.openxmlformats.org/drawingml/2006/diagram" xmlns:a="http://schemas.openxmlformats.org/drawingml/2006/main" uniqueId="urn:microsoft.com/office/officeart/2005/8/colors/accent0_3">
-  <dgm:title val=""/>
-  <dgm:desc val=""/>
-  <dgm:catLst>
-    <dgm:cat type="mainScheme" pri="10300"/>
-  </dgm:catLst>
-  <dgm:styleLbl name="node0">
-    <dgm:fillClrLst meth="repeat">
-      <a:schemeClr val="dk2"/>
-    </dgm:fillClrLst>
-    <dgm:linClrLst meth="repeat">
-      <a:schemeClr val="lt2"/>
-    </dgm:linClrLst>
-    <dgm:effectClrLst/>
-    <dgm:txLinClrLst/>
-    <dgm:txFillClrLst/>
-    <dgm:txEffectClrLst/>
-  </dgm:styleLbl>
-  <dgm:styleLbl name="alignNode1">
-    <dgm:fillClrLst meth="repeat">
-      <a:schemeClr val="dk2"/>
-    </dgm:fillClrLst>
-    <dgm:linClrLst meth="repeat">
-      <a:schemeClr val="dk2"/>
-    </dgm:linClrLst>
-    <dgm:effectClrLst/>
-    <dgm:txLinClrLst/>
-    <dgm:txFillClrLst/>
-    <dgm:txEffectClrLst/>
-  </dgm:styleLbl>
-  <dgm:styleLbl name="node1">
-    <dgm:fillClrLst meth="repeat">
-      <a:schemeClr val="dk2"/>
-    </dgm:fillClrLst>
-    <dgm:linClrLst meth="repeat">
-      <a:schemeClr val="lt2"/>
-    </dgm:linClrLst>
-    <dgm:effectClrLst/>
-    <dgm:txLinClrLst/>
-    <dgm:txFillClrLst/>
-    <dgm:txEffectClrLst/>
-  </dgm:styleLbl>
-  <dgm:styleLbl name="lnNode1">
-    <dgm:fillClrLst meth="repeat">
-      <a:schemeClr val="dk2"/>
-    </dgm:fillClrLst>
-    <dgm:linClrLst meth="repeat">
-      <a:schemeClr val="lt2"/>
-    </dgm:linClrLst>
-    <dgm:effectClrLst/>
-    <dgm:txLinClrLst/>
-    <dgm:txFillClrLst/>
-    <dgm:txEffectClrLst/>
-  </dgm:styleLbl>
-  <dgm:styleLbl name="vennNode1">
-    <dgm:fillClrLst meth="repeat">
-      <a:schemeClr val="dk2">
-        <a:alpha val="50000"/>
-      </a:schemeClr>
-    </dgm:fillClrLst>
-    <dgm:linClrLst meth="repeat">
-      <a:schemeClr val="lt2"/>
-    </dgm:linClrLst>
-    <dgm:effectClrLst/>
-    <dgm:txLinClrLst/>
-    <dgm:txFillClrLst/>
-    <dgm:txEffectClrLst/>
-  </dgm:styleLbl>
-  <dgm:styleLbl name="node2">
-    <dgm:fillClrLst meth="repeat">
-      <a:schemeClr val="dk2"/>
-    </dgm:fillClrLst>
-    <dgm:linClrLst meth="repeat">
-      <a:schemeClr val="lt2"/>
-    </dgm:linClrLst>
-    <dgm:effectClrLst/>
-    <dgm:txLinClrLst/>
-    <dgm:txFillClrLst/>
-    <dgm:txEffectClrLst/>
-  </dgm:styleLbl>
-  <dgm:styleLbl name="node3">
-    <dgm:fillClrLst meth="repeat">
-      <a:schemeClr val="dk2"/>
-    </dgm:fillClrLst>
-    <dgm:linClrLst meth="repeat">
-      <a:schemeClr val="lt2"/>
-    </dgm:linClrLst>
-    <dgm:effectClrLst/>
-    <dgm:txLinClrLst/>
-    <dgm:txFillClrLst/>
-    <dgm:txEffectClrLst/>
-  </dgm:styleLbl>
-  <dgm:styleLbl name="node4">
-    <dgm:fillClrLst meth="repeat">
-      <a:schemeClr val="dk2"/>
-    </dgm:fillClrLst>
-    <dgm:linClrLst meth="repeat">
-      <a:schemeClr val="lt2"/>
-    </dgm:linClrLst>
-    <dgm:effectClrLst/>
-    <dgm:txLinClrLst/>
-    <dgm:txFillClrLst/>
-    <dgm:txEffectClrLst/>
-  </dgm:styleLbl>
-  <dgm:styleLbl name="fgImgPlace1">
-    <dgm:fillClrLst meth="repeat">
-      <a:schemeClr val="dk2">
-        <a:tint val="50000"/>
-      </a:schemeClr>
-    </dgm:fillClrLst>
-    <dgm:linClrLst meth="repeat">
-      <a:schemeClr val="lt2"/>
-    </dgm:linClrLst>
-    <dgm:effectClrLst/>
-    <dgm:txLinClrLst/>
-    <dgm:txFillClrLst meth="repeat">
-      <a:schemeClr val="lt2"/>
-    </dgm:txFillClrLst>
-    <dgm:txEffectClrLst/>
-  </dgm:styleLbl>
-  <dgm:styleLbl name="alignImgPlace1">
-    <dgm:fillClrLst meth="repeat">
-      <a:schemeClr val="dk2">
-        <a:tint val="50000"/>
-      </a:schemeClr>
-    </dgm:fillClrLst>
-    <dgm:linClrLst meth="repeat">
-      <a:schemeClr val="dk2">
-        <a:shade val="80000"/>
-      </a:schemeClr>
-    </dgm:linClrLst>
-    <dgm:effectClrLst/>
-    <dgm:txLinClrLst/>
-    <dgm:txFillClrLst meth="repeat">
-      <a:schemeClr val="lt2"/>
-    </dgm:txFillClrLst>
-    <dgm:txEffectClrLst/>
-  </dgm:styleLbl>
-  <dgm:styleLbl name="bgImgPlace1">
-    <dgm:fillClrLst meth="repeat">
-      <a:schemeClr val="dk2">
-        <a:tint val="50000"/>
-      </a:schemeClr>
-    </dgm:fillClrLst>
-    <dgm:linClrLst meth="repeat">
-      <a:schemeClr val="dk2">
-        <a:shade val="80000"/>
-      </a:schemeClr>
-    </dgm:linClrLst>
-    <dgm:effectClrLst/>
-    <dgm:txLinClrLst/>
-    <dgm:txFillClrLst meth="repeat">
-      <a:schemeClr val="lt2"/>
-    </dgm:txFillClrLst>
-    <dgm:txEffectClrLst/>
-  </dgm:styleLbl>
-  <dgm:styleLbl name="sibTrans2D1">
-    <dgm:fillClrLst meth="repeat">
-      <a:schemeClr val="dk2">
-        <a:tint val="60000"/>
-      </a:schemeClr>
-    </dgm:fillClrLst>
-    <dgm:linClrLst meth="repeat">
-      <a:schemeClr val="dk2">
-        <a:tint val="60000"/>
-      </a:schemeClr>
-    </dgm:linClrLst>
-    <dgm:effectClrLst/>
-    <dgm:txLinClrLst/>
-    <dgm:txFillClrLst/>
-    <dgm:txEffectClrLst/>
-  </dgm:styleLbl>
-  <dgm:styleLbl name="fgSibTrans2D1">
-    <dgm:fillClrLst meth="repeat">
-      <a:schemeClr val="dk2">
-        <a:tint val="60000"/>
-      </a:schemeClr>
-    </dgm:fillClrLst>
-    <dgm:linClrLst meth="repeat">
-      <a:schemeClr val="dk2">
-        <a:tint val="60000"/>
-      </a:schemeClr>
-    </dgm:linClrLst>
-    <dgm:effectClrLst/>
-    <dgm:txLinClrLst/>
-    <dgm:txFillClrLst/>
-    <dgm:txEffectClrLst/>
-  </dgm:styleLbl>
-  <dgm:styleLbl name="bgSibTrans2D1">
-    <dgm:fillClrLst meth="repeat">
-      <a:schemeClr val="dk2">
-        <a:tint val="60000"/>
-      </a:schemeClr>
-    </dgm:fillClrLst>
-    <dgm:linClrLst meth="repeat">
-      <a:schemeClr val="dk2">
-        <a:tint val="60000"/>
-      </a:schemeClr>
-    </dgm:linClrLst>
-    <dgm:effectClrLst/>
-    <dgm:txLinClrLst/>
-    <dgm:txFillClrLst/>
-    <dgm:txEffectClrLst/>
-  </dgm:styleLbl>
-  <dgm:styleLbl name="sibTrans1D1">
-    <dgm:fillClrLst meth="repeat">
-      <a:schemeClr val="dk2"/>
-    </dgm:fillClrLst>
-    <dgm:linClrLst meth="repeat">
-      <a:schemeClr val="dk2"/>
-    </dgm:linClrLst>
-    <dgm:effectClrLst/>
-    <dgm:txLinClrLst/>
-    <dgm:txFillClrLst meth="repeat">
-      <a:schemeClr val="lt2"/>
-    </dgm:txFillClrLst>
-    <dgm:txEffectClrLst/>
-  </dgm:styleLbl>
-  <dgm:styleLbl name="callout">
-    <dgm:fillClrLst meth="repeat">
-      <a:schemeClr val="dk2"/>
-    </dgm:fillClrLst>
-    <dgm:linClrLst meth="repeat">
-      <a:schemeClr val="dk2">
-        <a:tint val="50000"/>
-      </a:schemeClr>
-    </dgm:linClrLst>
-    <dgm:effectClrLst/>
-    <dgm:txLinClrLst/>
-    <dgm:txFillClrLst meth="repeat">
-      <a:schemeClr val="lt2"/>
-    </dgm:txFillClrLst>
-    <dgm:txEffectClrLst/>
-  </dgm:styleLbl>
-  <dgm:styleLbl name="asst0">
-    <dgm:fillClrLst meth="repeat">
-      <a:schemeClr val="dk2"/>
-    </dgm:fillClrLst>
-    <dgm:linClrLst meth="repeat">
-      <a:schemeClr val="lt2"/>
-    </dgm:linClrLst>
-    <dgm:effectClrLst/>
-    <dgm:txLinClrLst/>
-    <dgm:txFillClrLst/>
-    <dgm:txEffectClrLst/>
-  </dgm:styleLbl>
-  <dgm:styleLbl name="asst1">
-    <dgm:fillClrLst meth="repeat">
-      <a:schemeClr val="dk2"/>
-    </dgm:fillClrLst>
-    <dgm:linClrLst meth="repeat">
-      <a:schemeClr val="lt2"/>
-    </dgm:linClrLst>
-    <dgm:effectClrLst/>
-    <dgm:txLinClrLst/>
-    <dgm:txFillClrLst/>
-    <dgm:txEffectClrLst/>
-  </dgm:styleLbl>
-  <dgm:styleLbl name="asst2">
-    <dgm:fillClrLst meth="repeat">
-      <a:schemeClr val="dk2"/>
-    </dgm:fillClrLst>
-    <dgm:linClrLst meth="repeat">
-      <a:schemeClr val="lt2"/>
-    </dgm:linClrLst>
-    <dgm:effectClrLst/>
-    <dgm:txLinClrLst/>
-    <dgm:txFillClrLst/>
-    <dgm:txEffectClrLst/>
-  </dgm:styleLbl>
-  <dgm:styleLbl name="asst3">
-    <dgm:fillClrLst meth="repeat">
-      <a:schemeClr val="dk2"/>
-    </dgm:fillClrLst>
-    <dgm:linClrLst meth="repeat">
-      <a:schemeClr val="lt2"/>
-    </dgm:linClrLst>
-    <dgm:effectClrLst/>
-    <dgm:txLinClrLst/>
-    <dgm:txFillClrLst/>
-    <dgm:txEffectClrLst/>
-  </dgm:styleLbl>
-  <dgm:styleLbl name="asst4">
-    <dgm:fillClrLst meth="repeat">
-      <a:schemeClr val="dk2"/>
-    </dgm:fillClrLst>
-    <dgm:linClrLst meth="repeat">
-      <a:schemeClr val="lt2"/>
-    </dgm:linClrLst>
-    <dgm:effectClrLst/>
-    <dgm:txLinClrLst/>
-    <dgm:txFillClrLst/>
-    <dgm:txEffectClrLst/>
-  </dgm:styleLbl>
-  <dgm:styleLbl name="parChTrans2D1">
-    <dgm:fillClrLst meth="repeat">
-      <a:schemeClr val="dk2">
-        <a:tint val="60000"/>
-      </a:schemeClr>
-    </dgm:fillClrLst>
-    <dgm:linClrLst meth="repeat">
-      <a:schemeClr val="dk2">
-        <a:tint val="60000"/>
-      </a:schemeClr>
-    </dgm:linClrLst>
-    <dgm:effectClrLst/>
-    <dgm:txLinClrLst/>
-    <dgm:txFillClrLst meth="repeat">
-      <a:schemeClr val="lt2"/>
-    </dgm:txFillClrLst>
-    <dgm:txEffectClrLst/>
-  </dgm:styleLbl>
-  <dgm:styleLbl name="parChTrans2D2">
-    <dgm:fillClrLst meth="repeat">
-      <a:schemeClr val="dk2"/>
-    </dgm:fillClrLst>
-    <dgm:linClrLst meth="repeat">
-      <a:schemeClr val="dk2"/>
-    </dgm:linClrLst>
-    <dgm:effectClrLst/>
-    <dgm:txLinClrLst/>
-    <dgm:txFillClrLst meth="repeat">
-      <a:schemeClr val="lt2"/>
-    </dgm:txFillClrLst>
-    <dgm:txEffectClrLst/>
-  </dgm:styleLbl>
-  <dgm:styleLbl name="parChTrans2D3">
-    <dgm:fillClrLst meth="repeat">
-      <a:schemeClr val="dk2"/>
-    </dgm:fillClrLst>
-    <dgm:linClrLst meth="repeat">
-      <a:schemeClr val="dk2"/>
-    </dgm:linClrLst>
-    <dgm:effectClrLst/>
-    <dgm:txLinClrLst/>
-    <dgm:txFillClrLst meth="repeat">
-      <a:schemeClr val="lt2"/>
-    </dgm:txFillClrLst>
-    <dgm:txEffectClrLst/>
-  </dgm:styleLbl>
-  <dgm:styleLbl name="parChTrans2D4">
-    <dgm:fillClrLst meth="repeat">
-      <a:schemeClr val="dk2"/>
-    </dgm:fillClrLst>
-    <dgm:linClrLst meth="repeat">
-      <a:schemeClr val="dk2"/>
-    </dgm:linClrLst>
-    <dgm:effectClrLst/>
-    <dgm:txLinClrLst/>
-    <dgm:txFillClrLst meth="repeat">
-      <a:schemeClr val="lt2"/>
-    </dgm:txFillClrLst>
-    <dgm:txEffectClrLst/>
-  </dgm:styleLbl>
-  <dgm:styleLbl name="parChTrans1D1">
-    <dgm:fillClrLst meth="repeat">
-      <a:schemeClr val="dk2"/>
-    </dgm:fillClrLst>
-    <dgm:linClrLst meth="repeat">
-      <a:schemeClr val="dk2">
-        <a:shade val="60000"/>
-      </a:schemeClr>
-    </dgm:linClrLst>
-    <dgm:effectClrLst/>
-    <dgm:txLinClrLst/>
-    <dgm:txFillClrLst meth="repeat">
-      <a:schemeClr val="tx1"/>
-    </dgm:txFillClrLst>
-    <dgm:txEffectClrLst/>
-  </dgm:styleLbl>
-  <dgm:styleLbl name="parChTrans1D2">
-    <dgm:fillClrLst meth="repeat">
-      <a:schemeClr val="dk2"/>
-    </dgm:fillClrLst>
-    <dgm:linClrLst meth="repeat">
-      <a:schemeClr val="dk2">
-        <a:shade val="60000"/>
-      </a:schemeClr>
-    </dgm:linClrLst>
-    <dgm:effectClrLst/>
-    <dgm:txLinClrLst/>
-    <dgm:txFillClrLst meth="repeat">
-      <a:schemeClr val="tx1"/>
-    </dgm:txFillClrLst>
-    <dgm:txEffectClrLst/>
-  </dgm:styleLbl>
-  <dgm:styleLbl name="parChTrans1D3">
-    <dgm:fillClrLst meth="repeat">
-      <a:schemeClr val="dk2"/>
-    </dgm:fillClrLst>
-    <dgm:linClrLst meth="repeat">
-      <a:schemeClr val="dk2">
-        <a:shade val="80000"/>
-      </a:schemeClr>
-    </dgm:linClrLst>
-    <dgm:effectClrLst/>
-    <dgm:txLinClrLst/>
-    <dgm:txFillClrLst meth="repeat">
-      <a:schemeClr val="tx1"/>
-    </dgm:txFillClrLst>
-    <dgm:txEffectClrLst/>
-  </dgm:styleLbl>
-  <dgm:styleLbl name="parChTrans1D4">
-    <dgm:fillClrLst meth="repeat">
-      <a:schemeClr val="dk2"/>
-    </dgm:fillClrLst>
-    <dgm:linClrLst meth="repeat">
-      <a:schemeClr val="dk2">
-        <a:shade val="80000"/>
-      </a:schemeClr>
-    </dgm:linClrLst>
-    <dgm:effectClrLst/>
-    <dgm:txLinClrLst/>
-    <dgm:txFillClrLst meth="repeat">
-      <a:schemeClr val="tx1"/>
-    </dgm:txFillClrLst>
-    <dgm:txEffectClrLst/>
-  </dgm:styleLbl>
-  <dgm:styleLbl name="fgAcc1">
-    <dgm:fillClrLst meth="repeat">
-      <a:schemeClr val="lt2">
-        <a:alpha val="90000"/>
-      </a:schemeClr>
-    </dgm:fillClrLst>
-    <dgm:linClrLst meth="repeat">
-      <a:schemeClr val="dk2"/>
-    </dgm:linClrLst>
-    <dgm:effectClrLst/>
-    <dgm:txLinClrLst/>
-    <dgm:txFillClrLst meth="repeat">
-      <a:schemeClr val="dk1"/>
-    </dgm:txFillClrLst>
-    <dgm:txEffectClrLst/>
-  </dgm:styleLbl>
-  <dgm:styleLbl name="conFgAcc1">
-    <dgm:fillClrLst meth="repeat">
-      <a:schemeClr val="lt2">
-        <a:alpha val="90000"/>
-      </a:schemeClr>
-    </dgm:fillClrLst>
-    <dgm:linClrLst meth="repeat">
-      <a:schemeClr val="dk2"/>
-    </dgm:linClrLst>
-    <dgm:effectClrLst/>
-    <dgm:txLinClrLst/>
-    <dgm:txFillClrLst meth="repeat">
-      <a:schemeClr val="dk1"/>
-    </dgm:txFillClrLst>
-    <dgm:txEffectClrLst/>
-  </dgm:styleLbl>
-  <dgm:styleLbl name="alignAcc1">
-    <dgm:fillClrLst meth="repeat">
-      <a:schemeClr val="lt2">
-        <a:alpha val="90000"/>
-      </a:schemeClr>
-    </dgm:fillClrLst>
-    <dgm:linClrLst meth="repeat">
-      <a:schemeClr val="dk2"/>
-    </dgm:linClrLst>
-    <dgm:effectClrLst/>
-    <dgm:txLinClrLst/>
-    <dgm:txFillClrLst meth="repeat">
-      <a:schemeClr val="dk1"/>
-    </dgm:txFillClrLst>
-    <dgm:txEffectClrLst/>
-  </dgm:styleLbl>
-  <dgm:styleLbl name="trAlignAcc1">
-    <dgm:fillClrLst meth="repeat">
-      <a:schemeClr val="lt2">
-        <a:alpha val="40000"/>
-      </a:schemeClr>
-    </dgm:fillClrLst>
-    <dgm:linClrLst meth="repeat">
-      <a:schemeClr val="dk2"/>
-    </dgm:linClrLst>
-    <dgm:effectClrLst/>
-    <dgm:txLinClrLst/>
-    <dgm:txFillClrLst meth="repeat">
-      <a:schemeClr val="dk1"/>
-    </dgm:txFillClrLst>
-    <dgm:txEffectClrLst/>
-  </dgm:styleLbl>
-  <dgm:styleLbl name="bgAcc1">
-    <dgm:fillClrLst meth="repeat">
-      <a:schemeClr val="lt2">
-        <a:alpha val="90000"/>
-      </a:schemeClr>
-    </dgm:fillClrLst>
-    <dgm:linClrLst meth="repeat">
-      <a:schemeClr val="dk2"/>
-    </dgm:linClrLst>
-    <dgm:effectClrLst/>
-    <dgm:txLinClrLst/>
-    <dgm:txFillClrLst meth="repeat">
-      <a:schemeClr val="dk1"/>
-    </dgm:txFillClrLst>
-    <dgm:txEffectClrLst/>
-  </dgm:styleLbl>
-  <dgm:styleLbl name="solidFgAcc1">
-    <dgm:fillClrLst meth="repeat">
-      <a:schemeClr val="lt2"/>
-    </dgm:fillClrLst>
-    <dgm:linClrLst meth="repeat">
-      <a:schemeClr val="dk2"/>
-    </dgm:linClrLst>
-    <dgm:effectClrLst/>
-    <dgm:txLinClrLst/>
-    <dgm:txFillClrLst meth="repeat">
-      <a:schemeClr val="dk1"/>
-    </dgm:txFillClrLst>
-    <dgm:txEffectClrLst/>
-  </dgm:styleLbl>
-  <dgm:styleLbl name="solidAlignAcc1">
-    <dgm:fillClrLst meth="repeat">
-      <a:schemeClr val="lt2"/>
-    </dgm:fillClrLst>
-    <dgm:linClrLst meth="repeat">
-      <a:schemeClr val="dk2"/>
-    </dgm:linClrLst>
-    <dgm:effectClrLst/>
-    <dgm:txLinClrLst/>
-    <dgm:txFillClrLst meth="repeat">
-      <a:schemeClr val="dk1"/>
-    </dgm:txFillClrLst>
-    <dgm:txEffectClrLst/>
-  </dgm:styleLbl>
-  <dgm:styleLbl name="solidBgAcc1">
-    <dgm:fillClrLst meth="repeat">
-      <a:schemeClr val="lt2"/>
-    </dgm:fillClrLst>
-    <dgm:linClrLst meth="repeat">
-      <a:schemeClr val="dk2"/>
-    </dgm:linClrLst>
-    <dgm:effectClrLst/>
-    <dgm:txLinClrLst/>
-    <dgm:txFillClrLst meth="repeat">
-      <a:schemeClr val="dk1"/>
-    </dgm:txFillClrLst>
-    <dgm:txEffectClrLst/>
-  </dgm:styleLbl>
-  <dgm:styleLbl name="fgAccFollowNode1">
-    <dgm:fillClrLst meth="repeat">
-      <a:schemeClr val="dk2">
-        <a:alpha val="90000"/>
-        <a:tint val="40000"/>
-      </a:schemeClr>
-    </dgm:fillClrLst>
-    <dgm:linClrLst meth="repeat">
-      <a:schemeClr val="dk2">
-        <a:alpha val="90000"/>
-        <a:tint val="40000"/>
-      </a:schemeClr>
-    </dgm:linClrLst>
-    <dgm:effectClrLst/>
-    <dgm:txLinClrLst/>
-    <dgm:txFillClrLst meth="repeat">
-      <a:schemeClr val="dk1"/>
-    </dgm:txFillClrLst>
-    <dgm:txEffectClrLst/>
-  </dgm:styleLbl>
-  <dgm:styleLbl name="alignAccFollowNode1">
-    <dgm:fillClrLst meth="repeat">
-      <a:schemeClr val="dk2">
-        <a:alpha val="90000"/>
-        <a:tint val="40000"/>
-      </a:schemeClr>
-    </dgm:fillClrLst>
-    <dgm:linClrLst meth="repeat">
-      <a:schemeClr val="dk2">
-        <a:alpha val="90000"/>
-        <a:tint val="40000"/>
-      </a:schemeClr>
-    </dgm:linClrLst>
-    <dgm:effectClrLst/>
-    <dgm:txLinClrLst/>
-    <dgm:txFillClrLst meth="repeat">
-      <a:schemeClr val="dk1"/>
-    </dgm:txFillClrLst>
-    <dgm:txEffectClrLst/>
-  </dgm:styleLbl>
-  <dgm:styleLbl name="bgAccFollowNode1">
-    <dgm:fillClrLst meth="repeat">
-      <a:schemeClr val="dk2">
-        <a:alpha val="90000"/>
-        <a:tint val="40000"/>
-      </a:schemeClr>
-    </dgm:fillClrLst>
-    <dgm:linClrLst meth="repeat">
-      <a:schemeClr val="dk2">
-        <a:alpha val="90000"/>
-        <a:tint val="40000"/>
-      </a:schemeClr>
-    </dgm:linClrLst>
-    <dgm:effectClrLst/>
-    <dgm:txLinClrLst/>
-    <dgm:txFillClrLst meth="repeat">
-      <a:schemeClr val="dk1"/>
-    </dgm:txFillClrLst>
-    <dgm:txEffectClrLst/>
-  </dgm:styleLbl>
-  <dgm:styleLbl name="fgAcc0">
-    <dgm:fillClrLst meth="repeat">
-      <a:schemeClr val="lt2">
-        <a:alpha val="90000"/>
-      </a:schemeClr>
-    </dgm:fillClrLst>
-    <dgm:linClrLst meth="repeat">
-      <a:schemeClr val="dk2"/>
-    </dgm:linClrLst>
-    <dgm:effectClrLst/>
-    <dgm:txLinClrLst/>
-    <dgm:txFillClrLst meth="repeat">
-      <a:schemeClr val="dk1"/>
-    </dgm:txFillClrLst>
-    <dgm:txEffectClrLst/>
-  </dgm:styleLbl>
-  <dgm:styleLbl name="fgAcc2">
-    <dgm:fillClrLst meth="repeat">
-      <a:schemeClr val="lt2">
-        <a:alpha val="90000"/>
-      </a:schemeClr>
-    </dgm:fillClrLst>
-    <dgm:linClrLst meth="repeat">
-      <a:schemeClr val="dk2"/>
-    </dgm:linClrLst>
-    <dgm:effectClrLst/>
-    <dgm:txLinClrLst/>
-    <dgm:txFillClrLst meth="repeat">
-      <a:schemeClr val="dk1"/>
-    </dgm:txFillClrLst>
-    <dgm:txEffectClrLst/>
-  </dgm:styleLbl>
-  <dgm:styleLbl name="fgAcc3">
-    <dgm:fillClrLst meth="repeat">
-      <a:schemeClr val="lt2">
-        <a:alpha val="90000"/>
-      </a:schemeClr>
-    </dgm:fillClrLst>
-    <dgm:linClrLst meth="repeat">
-      <a:schemeClr val="dk2"/>
-    </dgm:linClrLst>
-    <dgm:effectClrLst/>
-    <dgm:txLinClrLst/>
-    <dgm:txFillClrLst meth="repeat">
-      <a:schemeClr val="dk1"/>
-    </dgm:txFillClrLst>
-    <dgm:txEffectClrLst/>
-  </dgm:styleLbl>
-  <dgm:styleLbl name="fgAcc4">
-    <dgm:fillClrLst meth="repeat">
-      <a:schemeClr val="lt2">
-        <a:alpha val="90000"/>
-      </a:schemeClr>
-    </dgm:fillClrLst>
-    <dgm:linClrLst meth="repeat">
-      <a:schemeClr val="dk2"/>
-    </dgm:linClrLst>
-    <dgm:effectClrLst/>
-    <dgm:txLinClrLst/>
-    <dgm:txFillClrLst meth="repeat">
-      <a:schemeClr val="dk1"/>
-    </dgm:txFillClrLst>
-    <dgm:txEffectClrLst/>
-  </dgm:styleLbl>
-  <dgm:styleLbl name="bgShp">
-    <dgm:fillClrLst meth="repeat">
-      <a:schemeClr val="dk2">
-        <a:tint val="40000"/>
-      </a:schemeClr>
-    </dgm:fillClrLst>
-    <dgm:linClrLst meth="repeat">
-      <a:schemeClr val="dk2"/>
-    </dgm:linClrLst>
-    <dgm:effectClrLst/>
-    <dgm:txLinClrLst/>
-    <dgm:txFillClrLst meth="repeat">
-      <a:schemeClr val="dk1"/>
-    </dgm:txFillClrLst>
-    <dgm:txEffectClrLst/>
-  </dgm:styleLbl>
-  <dgm:styleLbl name="dkBgShp">
-    <dgm:fillClrLst meth="repeat">
-      <a:schemeClr val="dk2">
-        <a:shade val="80000"/>
-      </a:schemeClr>
-    </dgm:fillClrLst>
-    <dgm:linClrLst meth="repeat">
-      <a:schemeClr val="dk2"/>
-    </dgm:linClrLst>
-    <dgm:effectClrLst/>
-    <dgm:txLinClrLst/>
-    <dgm:txFillClrLst meth="repeat">
-      <a:schemeClr val="lt1"/>
-    </dgm:txFillClrLst>
-    <dgm:txEffectClrLst/>
-  </dgm:styleLbl>
-  <dgm:styleLbl name="trBgShp">
-    <dgm:fillClrLst meth="repeat">
-      <a:schemeClr val="dk2">
-        <a:tint val="50000"/>
-        <a:alpha val="40000"/>
-      </a:schemeClr>
-    </dgm:fillClrLst>
-    <dgm:linClrLst meth="repeat">
-      <a:schemeClr val="dk2"/>
-    </dgm:linClrLst>
-    <dgm:effectClrLst/>
-    <dgm:txLinClrLst/>
-    <dgm:txFillClrLst meth="repeat">
-      <a:schemeClr val="lt1"/>
-    </dgm:txFillClrLst>
-    <dgm:txEffectClrLst/>
-  </dgm:styleLbl>
-  <dgm:styleLbl name="fgShp">
-    <dgm:fillClrLst meth="repeat">
-      <a:schemeClr val="dk2">
-        <a:tint val="60000"/>
-      </a:schemeClr>
-    </dgm:fillClrLst>
-    <dgm:linClrLst meth="repeat">
-      <a:schemeClr val="lt2"/>
-    </dgm:linClrLst>
-    <dgm:effectClrLst/>
-    <dgm:txLinClrLst/>
-    <dgm:txFillClrLst meth="repeat">
-      <a:schemeClr val="dk1"/>
-    </dgm:txFillClrLst>
-    <dgm:txEffectClrLst/>
-  </dgm:styleLbl>
-  <dgm:styleLbl name="revTx">
-    <dgm:fillClrLst meth="repeat">
-      <a:schemeClr val="lt2">
-        <a:alpha val="0"/>
-      </a:schemeClr>
-    </dgm:fillClrLst>
-    <dgm:linClrLst meth="repeat">
-      <a:schemeClr val="dk1">
-        <a:alpha val="0"/>
-      </a:schemeClr>
-    </dgm:linClrLst>
-    <dgm:effectClrLst/>
-    <dgm:txLinClrLst/>
-    <dgm:txFillClrLst meth="repeat">
-      <a:schemeClr val="tx1"/>
-    </dgm:txFillClrLst>
-    <dgm:txEffectClrLst/>
-  </dgm:styleLbl>
-</dgm:colorsDef>
-</file>
-
 <file path=ppt/diagrams/data1.xml><?xml version="1.0" encoding="utf-8"?>
 <dgm:dataModel xmlns:dgm="http://schemas.openxmlformats.org/drawingml/2006/diagram" xmlns:a="http://schemas.openxmlformats.org/drawingml/2006/main">
   <dgm:ptLst>
@@ -4887,180 +4134,6 @@
   <dgm:extLst>
     <a:ext uri="http://schemas.microsoft.com/office/drawing/2008/diagram">
       <dsp:dataModelExt xmlns:dsp="http://schemas.microsoft.com/office/drawing/2008/diagram" relId="rId6" minVer="http://schemas.openxmlformats.org/drawingml/2006/diagram"/>
-    </a:ext>
-  </dgm:extLst>
-</dgm:dataModel>
-</file>
-
-<file path=ppt/diagrams/data4.xml><?xml version="1.0" encoding="utf-8"?>
-<dgm:dataModel xmlns:dgm="http://schemas.openxmlformats.org/drawingml/2006/diagram" xmlns:a="http://schemas.openxmlformats.org/drawingml/2006/main">
-  <dgm:ptLst>
-    <dgm:pt modelId="{95E0ADD5-7BA6-48A5-832A-E9585A014A65}" type="doc">
-      <dgm:prSet loTypeId="urn:microsoft.com/office/officeart/2005/8/layout/hierarchy1" loCatId="hierarchy" qsTypeId="urn:microsoft.com/office/officeart/2005/8/quickstyle/simple1" qsCatId="simple" csTypeId="urn:microsoft.com/office/officeart/2005/8/colors/accent0_3" csCatId="mainScheme"/>
-      <dgm:spPr/>
-      <dgm:t>
-        <a:bodyPr/>
-        <a:lstStyle/>
-        <a:p>
-          <a:endParaRPr lang="en-US"/>
-        </a:p>
-      </dgm:t>
-    </dgm:pt>
-    <dgm:pt modelId="{D779B35F-9A26-4108-8EB8-85AD48787D04}">
-      <dgm:prSet/>
-      <dgm:spPr/>
-      <dgm:t>
-        <a:bodyPr/>
-        <a:lstStyle/>
-        <a:p>
-          <a:r>
-            <a:rPr lang="en-US"/>
-            <a:t>MFCC: cuts the audio signal string into equally short (25ms) and overlaps (10ms). Each of these audio clips is transformed, calculated to obtain 39 features. </a:t>
-          </a:r>
-        </a:p>
-      </dgm:t>
-    </dgm:pt>
-    <dgm:pt modelId="{333B7171-0F76-4670-8C66-38B80C9DE109}" type="parTrans" cxnId="{F6B91A5F-0B1F-4A95-995E-3B2FD0349F48}">
-      <dgm:prSet/>
-      <dgm:spPr/>
-      <dgm:t>
-        <a:bodyPr/>
-        <a:lstStyle/>
-        <a:p>
-          <a:endParaRPr lang="en-US"/>
-        </a:p>
-      </dgm:t>
-    </dgm:pt>
-    <dgm:pt modelId="{2FB90D42-CB01-4320-AD36-93B9FF04377C}" type="sibTrans" cxnId="{F6B91A5F-0B1F-4A95-995E-3B2FD0349F48}">
-      <dgm:prSet/>
-      <dgm:spPr/>
-      <dgm:t>
-        <a:bodyPr/>
-        <a:lstStyle/>
-        <a:p>
-          <a:endParaRPr lang="en-US"/>
-        </a:p>
-      </dgm:t>
-    </dgm:pt>
-    <dgm:pt modelId="{37AD5B6E-8975-4595-885D-8D47CE467F6D}">
-      <dgm:prSet/>
-      <dgm:spPr/>
-      <dgm:t>
-        <a:bodyPr/>
-        <a:lstStyle/>
-        <a:p>
-          <a:r>
-            <a:rPr lang="en-US"/>
-            <a:t>Each list of 39 features has high independence, low noise, small enough to ensure computation, enough information to ensure quality for recognition algorithms.</a:t>
-          </a:r>
-        </a:p>
-      </dgm:t>
-    </dgm:pt>
-    <dgm:pt modelId="{EFD773D5-0261-49AC-A7BF-1AE6ED7F085B}" type="parTrans" cxnId="{AB10E447-8FBA-4ED6-B050-1A4646E3337F}">
-      <dgm:prSet/>
-      <dgm:spPr/>
-      <dgm:t>
-        <a:bodyPr/>
-        <a:lstStyle/>
-        <a:p>
-          <a:endParaRPr lang="en-US"/>
-        </a:p>
-      </dgm:t>
-    </dgm:pt>
-    <dgm:pt modelId="{B8A34B28-3EFE-496F-A57D-CF76E8FED70F}" type="sibTrans" cxnId="{AB10E447-8FBA-4ED6-B050-1A4646E3337F}">
-      <dgm:prSet/>
-      <dgm:spPr/>
-      <dgm:t>
-        <a:bodyPr/>
-        <a:lstStyle/>
-        <a:p>
-          <a:endParaRPr lang="en-US"/>
-        </a:p>
-      </dgm:t>
-    </dgm:pt>
-    <dgm:pt modelId="{8985EB33-8AF1-4AF8-977D-B8E1C7433C58}" type="pres">
-      <dgm:prSet presAssocID="{95E0ADD5-7BA6-48A5-832A-E9585A014A65}" presName="hierChild1" presStyleCnt="0">
-        <dgm:presLayoutVars>
-          <dgm:chPref val="1"/>
-          <dgm:dir/>
-          <dgm:animOne val="branch"/>
-          <dgm:animLvl val="lvl"/>
-          <dgm:resizeHandles/>
-        </dgm:presLayoutVars>
-      </dgm:prSet>
-      <dgm:spPr/>
-    </dgm:pt>
-    <dgm:pt modelId="{5C396E9A-F26F-4228-9409-2AAF4490C816}" type="pres">
-      <dgm:prSet presAssocID="{D779B35F-9A26-4108-8EB8-85AD48787D04}" presName="hierRoot1" presStyleCnt="0"/>
-      <dgm:spPr/>
-    </dgm:pt>
-    <dgm:pt modelId="{1421F8D6-EAAB-49AE-A786-F735F781441C}" type="pres">
-      <dgm:prSet presAssocID="{D779B35F-9A26-4108-8EB8-85AD48787D04}" presName="composite" presStyleCnt="0"/>
-      <dgm:spPr/>
-    </dgm:pt>
-    <dgm:pt modelId="{4D7BDE1B-2575-496A-8F69-D1E0A89BB0E1}" type="pres">
-      <dgm:prSet presAssocID="{D779B35F-9A26-4108-8EB8-85AD48787D04}" presName="background" presStyleLbl="node0" presStyleIdx="0" presStyleCnt="2"/>
-      <dgm:spPr/>
-    </dgm:pt>
-    <dgm:pt modelId="{B4F91235-821F-4C53-8B1D-4A1EDF692CCE}" type="pres">
-      <dgm:prSet presAssocID="{D779B35F-9A26-4108-8EB8-85AD48787D04}" presName="text" presStyleLbl="fgAcc0" presStyleIdx="0" presStyleCnt="2">
-        <dgm:presLayoutVars>
-          <dgm:chPref val="3"/>
-        </dgm:presLayoutVars>
-      </dgm:prSet>
-      <dgm:spPr/>
-    </dgm:pt>
-    <dgm:pt modelId="{E73D0733-1401-409F-AF68-0A28F7A0EEAF}" type="pres">
-      <dgm:prSet presAssocID="{D779B35F-9A26-4108-8EB8-85AD48787D04}" presName="hierChild2" presStyleCnt="0"/>
-      <dgm:spPr/>
-    </dgm:pt>
-    <dgm:pt modelId="{1EF0E7C5-35A5-4901-8FF9-FAA49142E337}" type="pres">
-      <dgm:prSet presAssocID="{37AD5B6E-8975-4595-885D-8D47CE467F6D}" presName="hierRoot1" presStyleCnt="0"/>
-      <dgm:spPr/>
-    </dgm:pt>
-    <dgm:pt modelId="{BAAA0EA6-8999-448B-AFC3-51E578607CFA}" type="pres">
-      <dgm:prSet presAssocID="{37AD5B6E-8975-4595-885D-8D47CE467F6D}" presName="composite" presStyleCnt="0"/>
-      <dgm:spPr/>
-    </dgm:pt>
-    <dgm:pt modelId="{01E17E00-6BC4-4DB6-8277-6FEF167F628C}" type="pres">
-      <dgm:prSet presAssocID="{37AD5B6E-8975-4595-885D-8D47CE467F6D}" presName="background" presStyleLbl="node0" presStyleIdx="1" presStyleCnt="2"/>
-      <dgm:spPr/>
-    </dgm:pt>
-    <dgm:pt modelId="{1EE8E26C-BC1A-437D-95BE-D51A84A86E16}" type="pres">
-      <dgm:prSet presAssocID="{37AD5B6E-8975-4595-885D-8D47CE467F6D}" presName="text" presStyleLbl="fgAcc0" presStyleIdx="1" presStyleCnt="2">
-        <dgm:presLayoutVars>
-          <dgm:chPref val="3"/>
-        </dgm:presLayoutVars>
-      </dgm:prSet>
-      <dgm:spPr/>
-    </dgm:pt>
-    <dgm:pt modelId="{233DF523-774E-4D60-89AD-A80E6DE8C991}" type="pres">
-      <dgm:prSet presAssocID="{37AD5B6E-8975-4595-885D-8D47CE467F6D}" presName="hierChild2" presStyleCnt="0"/>
-      <dgm:spPr/>
-    </dgm:pt>
-  </dgm:ptLst>
-  <dgm:cxnLst>
-    <dgm:cxn modelId="{F6B91A5F-0B1F-4A95-995E-3B2FD0349F48}" srcId="{95E0ADD5-7BA6-48A5-832A-E9585A014A65}" destId="{D779B35F-9A26-4108-8EB8-85AD48787D04}" srcOrd="0" destOrd="0" parTransId="{333B7171-0F76-4670-8C66-38B80C9DE109}" sibTransId="{2FB90D42-CB01-4320-AD36-93B9FF04377C}"/>
-    <dgm:cxn modelId="{AB10E447-8FBA-4ED6-B050-1A4646E3337F}" srcId="{95E0ADD5-7BA6-48A5-832A-E9585A014A65}" destId="{37AD5B6E-8975-4595-885D-8D47CE467F6D}" srcOrd="1" destOrd="0" parTransId="{EFD773D5-0261-49AC-A7BF-1AE6ED7F085B}" sibTransId="{B8A34B28-3EFE-496F-A57D-CF76E8FED70F}"/>
-    <dgm:cxn modelId="{0243B657-BE7D-4A2F-B5F4-9475D115399C}" type="presOf" srcId="{D779B35F-9A26-4108-8EB8-85AD48787D04}" destId="{B4F91235-821F-4C53-8B1D-4A1EDF692CCE}" srcOrd="0" destOrd="0" presId="urn:microsoft.com/office/officeart/2005/8/layout/hierarchy1"/>
-    <dgm:cxn modelId="{5BB744C5-DEC7-4AF1-BCF1-F5CFBF69F3C4}" type="presOf" srcId="{37AD5B6E-8975-4595-885D-8D47CE467F6D}" destId="{1EE8E26C-BC1A-437D-95BE-D51A84A86E16}" srcOrd="0" destOrd="0" presId="urn:microsoft.com/office/officeart/2005/8/layout/hierarchy1"/>
-    <dgm:cxn modelId="{DBA1BBE4-9E41-45E4-9A44-D33C2CF27ABB}" type="presOf" srcId="{95E0ADD5-7BA6-48A5-832A-E9585A014A65}" destId="{8985EB33-8AF1-4AF8-977D-B8E1C7433C58}" srcOrd="0" destOrd="0" presId="urn:microsoft.com/office/officeart/2005/8/layout/hierarchy1"/>
-    <dgm:cxn modelId="{01472CF8-27A5-4C9E-9431-1AE749CAE58B}" type="presParOf" srcId="{8985EB33-8AF1-4AF8-977D-B8E1C7433C58}" destId="{5C396E9A-F26F-4228-9409-2AAF4490C816}" srcOrd="0" destOrd="0" presId="urn:microsoft.com/office/officeart/2005/8/layout/hierarchy1"/>
-    <dgm:cxn modelId="{EE76B565-558A-4FBC-A14B-DEAF1F597604}" type="presParOf" srcId="{5C396E9A-F26F-4228-9409-2AAF4490C816}" destId="{1421F8D6-EAAB-49AE-A786-F735F781441C}" srcOrd="0" destOrd="0" presId="urn:microsoft.com/office/officeart/2005/8/layout/hierarchy1"/>
-    <dgm:cxn modelId="{7BCEBB8B-9127-4E66-BE16-C148316723C9}" type="presParOf" srcId="{1421F8D6-EAAB-49AE-A786-F735F781441C}" destId="{4D7BDE1B-2575-496A-8F69-D1E0A89BB0E1}" srcOrd="0" destOrd="0" presId="urn:microsoft.com/office/officeart/2005/8/layout/hierarchy1"/>
-    <dgm:cxn modelId="{C212BB35-5559-49A4-B180-9826B63DCF81}" type="presParOf" srcId="{1421F8D6-EAAB-49AE-A786-F735F781441C}" destId="{B4F91235-821F-4C53-8B1D-4A1EDF692CCE}" srcOrd="1" destOrd="0" presId="urn:microsoft.com/office/officeart/2005/8/layout/hierarchy1"/>
-    <dgm:cxn modelId="{4F0FDCB0-12D7-4E3E-82D8-320466F955B3}" type="presParOf" srcId="{5C396E9A-F26F-4228-9409-2AAF4490C816}" destId="{E73D0733-1401-409F-AF68-0A28F7A0EEAF}" srcOrd="1" destOrd="0" presId="urn:microsoft.com/office/officeart/2005/8/layout/hierarchy1"/>
-    <dgm:cxn modelId="{32CA2A41-6079-49A1-9ED6-54A4EAD7C783}" type="presParOf" srcId="{8985EB33-8AF1-4AF8-977D-B8E1C7433C58}" destId="{1EF0E7C5-35A5-4901-8FF9-FAA49142E337}" srcOrd="1" destOrd="0" presId="urn:microsoft.com/office/officeart/2005/8/layout/hierarchy1"/>
-    <dgm:cxn modelId="{F3816F76-3205-42F5-A2F1-9FFD55EE837F}" type="presParOf" srcId="{1EF0E7C5-35A5-4901-8FF9-FAA49142E337}" destId="{BAAA0EA6-8999-448B-AFC3-51E578607CFA}" srcOrd="0" destOrd="0" presId="urn:microsoft.com/office/officeart/2005/8/layout/hierarchy1"/>
-    <dgm:cxn modelId="{7F922EDE-8A99-4F75-BE5F-EA88C7C73AC7}" type="presParOf" srcId="{BAAA0EA6-8999-448B-AFC3-51E578607CFA}" destId="{01E17E00-6BC4-4DB6-8277-6FEF167F628C}" srcOrd="0" destOrd="0" presId="urn:microsoft.com/office/officeart/2005/8/layout/hierarchy1"/>
-    <dgm:cxn modelId="{68080A8D-3486-4541-8F9E-CF26416C3E86}" type="presParOf" srcId="{BAAA0EA6-8999-448B-AFC3-51E578607CFA}" destId="{1EE8E26C-BC1A-437D-95BE-D51A84A86E16}" srcOrd="1" destOrd="0" presId="urn:microsoft.com/office/officeart/2005/8/layout/hierarchy1"/>
-    <dgm:cxn modelId="{3D5A5249-48F2-4B74-AC40-1EC7286B931B}" type="presParOf" srcId="{1EF0E7C5-35A5-4901-8FF9-FAA49142E337}" destId="{233DF523-774E-4D60-89AD-A80E6DE8C991}" srcOrd="1" destOrd="0" presId="urn:microsoft.com/office/officeart/2005/8/layout/hierarchy1"/>
-  </dgm:cxnLst>
-  <dgm:bg/>
-  <dgm:whole/>
-  <dgm:extLst>
-    <a:ext uri="http://schemas.microsoft.com/office/drawing/2008/diagram">
-      <dsp:dataModelExt xmlns:dsp="http://schemas.microsoft.com/office/drawing/2008/diagram" relId="rId7" minVer="http://schemas.openxmlformats.org/drawingml/2006/diagram"/>
     </a:ext>
   </dgm:extLst>
 </dgm:dataModel>
@@ -6089,280 +5162,6 @@
       <dsp:txXfrm>
         <a:off x="128851" y="2937458"/>
         <a:ext cx="6005938" cy="2381817"/>
-      </dsp:txXfrm>
-    </dsp:sp>
-  </dsp:spTree>
-</dsp:drawing>
-</file>
-
-<file path=ppt/diagrams/drawing4.xml><?xml version="1.0" encoding="utf-8"?>
-<dsp:drawing xmlns:dgm="http://schemas.openxmlformats.org/drawingml/2006/diagram" xmlns:dsp="http://schemas.microsoft.com/office/drawing/2008/diagram" xmlns:a="http://schemas.openxmlformats.org/drawingml/2006/main">
-  <dsp:spTree>
-    <dsp:nvGrpSpPr>
-      <dsp:cNvPr id="0" name=""/>
-      <dsp:cNvGrpSpPr/>
-    </dsp:nvGrpSpPr>
-    <dsp:grpSpPr/>
-    <dsp:sp modelId="{4D7BDE1B-2575-496A-8F69-D1E0A89BB0E1}">
-      <dsp:nvSpPr>
-        <dsp:cNvPr id="0" name=""/>
-        <dsp:cNvSpPr/>
-      </dsp:nvSpPr>
-      <dsp:spPr>
-        <a:xfrm>
-          <a:off x="134291" y="612"/>
-          <a:ext cx="4332795" cy="2751325"/>
-        </a:xfrm>
-        <a:prstGeom prst="roundRect">
-          <a:avLst>
-            <a:gd name="adj" fmla="val 10000"/>
-          </a:avLst>
-        </a:prstGeom>
-        <a:solidFill>
-          <a:schemeClr val="dk2">
-            <a:hueOff val="0"/>
-            <a:satOff val="0"/>
-            <a:lumOff val="0"/>
-            <a:alphaOff val="0"/>
-          </a:schemeClr>
-        </a:solidFill>
-        <a:ln w="12700" cap="flat" cmpd="sng" algn="ctr">
-          <a:solidFill>
-            <a:schemeClr val="lt2">
-              <a:hueOff val="0"/>
-              <a:satOff val="0"/>
-              <a:lumOff val="0"/>
-              <a:alphaOff val="0"/>
-            </a:schemeClr>
-          </a:solidFill>
-          <a:prstDash val="solid"/>
-          <a:miter lim="800000"/>
-        </a:ln>
-        <a:effectLst/>
-      </dsp:spPr>
-      <dsp:style>
-        <a:lnRef idx="2">
-          <a:scrgbClr r="0" g="0" b="0"/>
-        </a:lnRef>
-        <a:fillRef idx="1">
-          <a:scrgbClr r="0" g="0" b="0"/>
-        </a:fillRef>
-        <a:effectRef idx="0">
-          <a:scrgbClr r="0" g="0" b="0"/>
-        </a:effectRef>
-        <a:fontRef idx="minor">
-          <a:schemeClr val="lt1"/>
-        </a:fontRef>
-      </dsp:style>
-    </dsp:sp>
-    <dsp:sp modelId="{B4F91235-821F-4C53-8B1D-4A1EDF692CCE}">
-      <dsp:nvSpPr>
-        <dsp:cNvPr id="0" name=""/>
-        <dsp:cNvSpPr/>
-      </dsp:nvSpPr>
-      <dsp:spPr>
-        <a:xfrm>
-          <a:off x="615713" y="457963"/>
-          <a:ext cx="4332795" cy="2751325"/>
-        </a:xfrm>
-        <a:prstGeom prst="roundRect">
-          <a:avLst>
-            <a:gd name="adj" fmla="val 10000"/>
-          </a:avLst>
-        </a:prstGeom>
-        <a:solidFill>
-          <a:schemeClr val="lt2">
-            <a:alpha val="90000"/>
-            <a:hueOff val="0"/>
-            <a:satOff val="0"/>
-            <a:lumOff val="0"/>
-            <a:alphaOff val="0"/>
-          </a:schemeClr>
-        </a:solidFill>
-        <a:ln w="12700" cap="flat" cmpd="sng" algn="ctr">
-          <a:solidFill>
-            <a:schemeClr val="dk2">
-              <a:hueOff val="0"/>
-              <a:satOff val="0"/>
-              <a:lumOff val="0"/>
-              <a:alphaOff val="0"/>
-            </a:schemeClr>
-          </a:solidFill>
-          <a:prstDash val="solid"/>
-          <a:miter lim="800000"/>
-        </a:ln>
-        <a:effectLst/>
-      </dsp:spPr>
-      <dsp:style>
-        <a:lnRef idx="2">
-          <a:scrgbClr r="0" g="0" b="0"/>
-        </a:lnRef>
-        <a:fillRef idx="1">
-          <a:scrgbClr r="0" g="0" b="0"/>
-        </a:fillRef>
-        <a:effectRef idx="0">
-          <a:scrgbClr r="0" g="0" b="0"/>
-        </a:effectRef>
-        <a:fontRef idx="minor"/>
-      </dsp:style>
-      <dsp:txBody>
-        <a:bodyPr spcFirstLastPara="0" vert="horz" wrap="square" lIns="99060" tIns="99060" rIns="99060" bIns="99060" numCol="1" spcCol="1270" anchor="ctr" anchorCtr="0">
-          <a:noAutofit/>
-        </a:bodyPr>
-        <a:lstStyle/>
-        <a:p>
-          <a:pPr marL="0" lvl="0" indent="0" algn="ctr" defTabSz="1155700">
-            <a:lnSpc>
-              <a:spcPct val="90000"/>
-            </a:lnSpc>
-            <a:spcBef>
-              <a:spcPct val="0"/>
-            </a:spcBef>
-            <a:spcAft>
-              <a:spcPct val="35000"/>
-            </a:spcAft>
-            <a:buNone/>
-          </a:pPr>
-          <a:r>
-            <a:rPr lang="en-US" sz="2600" kern="1200"/>
-            <a:t>MFCC: cuts the audio signal string into equally short (25ms) and overlaps (10ms). Each of these audio clips is transformed, calculated to obtain 39 features. </a:t>
-          </a:r>
-        </a:p>
-      </dsp:txBody>
-      <dsp:txXfrm>
-        <a:off x="696297" y="538547"/>
-        <a:ext cx="4171627" cy="2590157"/>
-      </dsp:txXfrm>
-    </dsp:sp>
-    <dsp:sp modelId="{01E17E00-6BC4-4DB6-8277-6FEF167F628C}">
-      <dsp:nvSpPr>
-        <dsp:cNvPr id="0" name=""/>
-        <dsp:cNvSpPr/>
-      </dsp:nvSpPr>
-      <dsp:spPr>
-        <a:xfrm>
-          <a:off x="5429930" y="612"/>
-          <a:ext cx="4332795" cy="2751325"/>
-        </a:xfrm>
-        <a:prstGeom prst="roundRect">
-          <a:avLst>
-            <a:gd name="adj" fmla="val 10000"/>
-          </a:avLst>
-        </a:prstGeom>
-        <a:solidFill>
-          <a:schemeClr val="dk2">
-            <a:hueOff val="0"/>
-            <a:satOff val="0"/>
-            <a:lumOff val="0"/>
-            <a:alphaOff val="0"/>
-          </a:schemeClr>
-        </a:solidFill>
-        <a:ln w="12700" cap="flat" cmpd="sng" algn="ctr">
-          <a:solidFill>
-            <a:schemeClr val="lt2">
-              <a:hueOff val="0"/>
-              <a:satOff val="0"/>
-              <a:lumOff val="0"/>
-              <a:alphaOff val="0"/>
-            </a:schemeClr>
-          </a:solidFill>
-          <a:prstDash val="solid"/>
-          <a:miter lim="800000"/>
-        </a:ln>
-        <a:effectLst/>
-      </dsp:spPr>
-      <dsp:style>
-        <a:lnRef idx="2">
-          <a:scrgbClr r="0" g="0" b="0"/>
-        </a:lnRef>
-        <a:fillRef idx="1">
-          <a:scrgbClr r="0" g="0" b="0"/>
-        </a:fillRef>
-        <a:effectRef idx="0">
-          <a:scrgbClr r="0" g="0" b="0"/>
-        </a:effectRef>
-        <a:fontRef idx="minor">
-          <a:schemeClr val="lt1"/>
-        </a:fontRef>
-      </dsp:style>
-    </dsp:sp>
-    <dsp:sp modelId="{1EE8E26C-BC1A-437D-95BE-D51A84A86E16}">
-      <dsp:nvSpPr>
-        <dsp:cNvPr id="0" name=""/>
-        <dsp:cNvSpPr/>
-      </dsp:nvSpPr>
-      <dsp:spPr>
-        <a:xfrm>
-          <a:off x="5911352" y="457963"/>
-          <a:ext cx="4332795" cy="2751325"/>
-        </a:xfrm>
-        <a:prstGeom prst="roundRect">
-          <a:avLst>
-            <a:gd name="adj" fmla="val 10000"/>
-          </a:avLst>
-        </a:prstGeom>
-        <a:solidFill>
-          <a:schemeClr val="lt2">
-            <a:alpha val="90000"/>
-            <a:hueOff val="0"/>
-            <a:satOff val="0"/>
-            <a:lumOff val="0"/>
-            <a:alphaOff val="0"/>
-          </a:schemeClr>
-        </a:solidFill>
-        <a:ln w="12700" cap="flat" cmpd="sng" algn="ctr">
-          <a:solidFill>
-            <a:schemeClr val="dk2">
-              <a:hueOff val="0"/>
-              <a:satOff val="0"/>
-              <a:lumOff val="0"/>
-              <a:alphaOff val="0"/>
-            </a:schemeClr>
-          </a:solidFill>
-          <a:prstDash val="solid"/>
-          <a:miter lim="800000"/>
-        </a:ln>
-        <a:effectLst/>
-      </dsp:spPr>
-      <dsp:style>
-        <a:lnRef idx="2">
-          <a:scrgbClr r="0" g="0" b="0"/>
-        </a:lnRef>
-        <a:fillRef idx="1">
-          <a:scrgbClr r="0" g="0" b="0"/>
-        </a:fillRef>
-        <a:effectRef idx="0">
-          <a:scrgbClr r="0" g="0" b="0"/>
-        </a:effectRef>
-        <a:fontRef idx="minor"/>
-      </dsp:style>
-      <dsp:txBody>
-        <a:bodyPr spcFirstLastPara="0" vert="horz" wrap="square" lIns="99060" tIns="99060" rIns="99060" bIns="99060" numCol="1" spcCol="1270" anchor="ctr" anchorCtr="0">
-          <a:noAutofit/>
-        </a:bodyPr>
-        <a:lstStyle/>
-        <a:p>
-          <a:pPr marL="0" lvl="0" indent="0" algn="ctr" defTabSz="1155700">
-            <a:lnSpc>
-              <a:spcPct val="90000"/>
-            </a:lnSpc>
-            <a:spcBef>
-              <a:spcPct val="0"/>
-            </a:spcBef>
-            <a:spcAft>
-              <a:spcPct val="35000"/>
-            </a:spcAft>
-            <a:buNone/>
-          </a:pPr>
-          <a:r>
-            <a:rPr lang="en-US" sz="2600" kern="1200"/>
-            <a:t>Each list of 39 features has high independence, low noise, small enough to ensure computation, enough information to ensure quality for recognition algorithms.</a:t>
-          </a:r>
-        </a:p>
-      </dsp:txBody>
-      <dsp:txXfrm>
-        <a:off x="5991936" y="538547"/>
-        <a:ext cx="4171627" cy="2590157"/>
       </dsp:txXfrm>
     </dsp:sp>
   </dsp:spTree>
@@ -7468,569 +6267,6 @@
 </dgm:layoutDef>
 </file>
 
-<file path=ppt/diagrams/layout4.xml><?xml version="1.0" encoding="utf-8"?>
-<dgm:layoutDef xmlns:dgm="http://schemas.openxmlformats.org/drawingml/2006/diagram" xmlns:a="http://schemas.openxmlformats.org/drawingml/2006/main" uniqueId="urn:microsoft.com/office/officeart/2005/8/layout/hierarchy1">
-  <dgm:title val=""/>
-  <dgm:desc val=""/>
-  <dgm:catLst>
-    <dgm:cat type="hierarchy" pri="2000"/>
-  </dgm:catLst>
-  <dgm:sampData>
-    <dgm:dataModel>
-      <dgm:ptLst>
-        <dgm:pt modelId="0" type="doc"/>
-        <dgm:pt modelId="1">
-          <dgm:prSet phldr="1"/>
-        </dgm:pt>
-        <dgm:pt modelId="2">
-          <dgm:prSet phldr="1"/>
-        </dgm:pt>
-        <dgm:pt modelId="21">
-          <dgm:prSet phldr="1"/>
-        </dgm:pt>
-        <dgm:pt modelId="22">
-          <dgm:prSet phldr="1"/>
-        </dgm:pt>
-        <dgm:pt modelId="3">
-          <dgm:prSet phldr="1"/>
-        </dgm:pt>
-        <dgm:pt modelId="31">
-          <dgm:prSet phldr="1"/>
-        </dgm:pt>
-      </dgm:ptLst>
-      <dgm:cxnLst>
-        <dgm:cxn modelId="4" srcId="0" destId="1" srcOrd="0" destOrd="0"/>
-        <dgm:cxn modelId="5" srcId="1" destId="2" srcOrd="0" destOrd="0"/>
-        <dgm:cxn modelId="6" srcId="1" destId="3" srcOrd="1" destOrd="0"/>
-        <dgm:cxn modelId="23" srcId="2" destId="21" srcOrd="0" destOrd="0"/>
-        <dgm:cxn modelId="24" srcId="2" destId="22" srcOrd="1" destOrd="0"/>
-        <dgm:cxn modelId="33" srcId="3" destId="31" srcOrd="0" destOrd="0"/>
-      </dgm:cxnLst>
-      <dgm:bg/>
-      <dgm:whole/>
-    </dgm:dataModel>
-  </dgm:sampData>
-  <dgm:styleData>
-    <dgm:dataModel>
-      <dgm:ptLst>
-        <dgm:pt modelId="0" type="doc"/>
-        <dgm:pt modelId="1"/>
-        <dgm:pt modelId="11"/>
-        <dgm:pt modelId="12"/>
-      </dgm:ptLst>
-      <dgm:cxnLst>
-        <dgm:cxn modelId="2" srcId="0" destId="1" srcOrd="0" destOrd="0"/>
-        <dgm:cxn modelId="13" srcId="1" destId="11" srcOrd="0" destOrd="0"/>
-        <dgm:cxn modelId="14" srcId="1" destId="12" srcOrd="1" destOrd="0"/>
-      </dgm:cxnLst>
-      <dgm:bg/>
-      <dgm:whole/>
-    </dgm:dataModel>
-  </dgm:styleData>
-  <dgm:clrData>
-    <dgm:dataModel>
-      <dgm:ptLst>
-        <dgm:pt modelId="0" type="doc"/>
-        <dgm:pt modelId="1"/>
-        <dgm:pt modelId="2"/>
-        <dgm:pt modelId="21"/>
-        <dgm:pt modelId="211"/>
-        <dgm:pt modelId="3"/>
-        <dgm:pt modelId="31"/>
-        <dgm:pt modelId="311"/>
-      </dgm:ptLst>
-      <dgm:cxnLst>
-        <dgm:cxn modelId="4" srcId="0" destId="1" srcOrd="0" destOrd="0"/>
-        <dgm:cxn modelId="5" srcId="1" destId="2" srcOrd="0" destOrd="0"/>
-        <dgm:cxn modelId="6" srcId="1" destId="3" srcOrd="1" destOrd="0"/>
-        <dgm:cxn modelId="23" srcId="2" destId="21" srcOrd="0" destOrd="0"/>
-        <dgm:cxn modelId="24" srcId="21" destId="211" srcOrd="0" destOrd="0"/>
-        <dgm:cxn modelId="33" srcId="3" destId="31" srcOrd="0" destOrd="0"/>
-        <dgm:cxn modelId="34" srcId="31" destId="311" srcOrd="0" destOrd="0"/>
-      </dgm:cxnLst>
-      <dgm:bg/>
-      <dgm:whole/>
-    </dgm:dataModel>
-  </dgm:clrData>
-  <dgm:layoutNode name="hierChild1">
-    <dgm:varLst>
-      <dgm:chPref val="1"/>
-      <dgm:dir/>
-      <dgm:animOne val="branch"/>
-      <dgm:animLvl val="lvl"/>
-      <dgm:resizeHandles/>
-    </dgm:varLst>
-    <dgm:choose name="Name0">
-      <dgm:if name="Name1" func="var" arg="dir" op="equ" val="norm">
-        <dgm:alg type="hierChild">
-          <dgm:param type="linDir" val="fromL"/>
-        </dgm:alg>
-      </dgm:if>
-      <dgm:else name="Name2">
-        <dgm:alg type="hierChild">
-          <dgm:param type="linDir" val="fromR"/>
-        </dgm:alg>
-      </dgm:else>
-    </dgm:choose>
-    <dgm:shape xmlns:r="http://schemas.openxmlformats.org/officeDocument/2006/relationships" r:blip="">
-      <dgm:adjLst/>
-    </dgm:shape>
-    <dgm:presOf/>
-    <dgm:constrLst>
-      <dgm:constr type="primFontSz" for="des" ptType="node" op="equ" val="65"/>
-      <dgm:constr type="w" for="des" forName="composite" refType="w"/>
-      <dgm:constr type="h" for="des" forName="composite" refType="w" refFor="des" refForName="composite" fact="0.667"/>
-      <dgm:constr type="w" for="des" forName="composite2" refType="w" refFor="des" refForName="composite"/>
-      <dgm:constr type="h" for="des" forName="composite2" refType="h" refFor="des" refForName="composite"/>
-      <dgm:constr type="w" for="des" forName="composite3" refType="w" refFor="des" refForName="composite"/>
-      <dgm:constr type="h" for="des" forName="composite3" refType="h" refFor="des" refForName="composite"/>
-      <dgm:constr type="w" for="des" forName="composite4" refType="w" refFor="des" refForName="composite"/>
-      <dgm:constr type="h" for="des" forName="composite4" refType="h" refFor="des" refForName="composite"/>
-      <dgm:constr type="w" for="des" forName="composite5" refType="w" refFor="des" refForName="composite"/>
-      <dgm:constr type="h" for="des" forName="composite5" refType="h" refFor="des" refForName="composite"/>
-      <dgm:constr type="sibSp" refType="w" refFor="des" refForName="composite" fact="0.1"/>
-      <dgm:constr type="sibSp" for="des" forName="hierChild2" refType="sibSp"/>
-      <dgm:constr type="sibSp" for="des" forName="hierChild3" refType="sibSp"/>
-      <dgm:constr type="sibSp" for="des" forName="hierChild4" refType="sibSp"/>
-      <dgm:constr type="sibSp" for="des" forName="hierChild5" refType="sibSp"/>
-      <dgm:constr type="sibSp" for="des" forName="hierChild6" refType="sibSp"/>
-      <dgm:constr type="sp" for="des" forName="hierRoot1" refType="h" refFor="des" refForName="composite" fact="0.25"/>
-      <dgm:constr type="sp" for="des" forName="hierRoot2" refType="sp" refFor="des" refForName="hierRoot1"/>
-      <dgm:constr type="sp" for="des" forName="hierRoot3" refType="sp" refFor="des" refForName="hierRoot1"/>
-      <dgm:constr type="sp" for="des" forName="hierRoot4" refType="sp" refFor="des" refForName="hierRoot1"/>
-      <dgm:constr type="sp" for="des" forName="hierRoot5" refType="sp" refFor="des" refForName="hierRoot1"/>
-    </dgm:constrLst>
-    <dgm:ruleLst/>
-    <dgm:forEach name="Name3" axis="ch">
-      <dgm:forEach name="Name4" axis="self" ptType="node">
-        <dgm:layoutNode name="hierRoot1">
-          <dgm:alg type="hierRoot"/>
-          <dgm:shape xmlns:r="http://schemas.openxmlformats.org/officeDocument/2006/relationships" r:blip="">
-            <dgm:adjLst/>
-          </dgm:shape>
-          <dgm:presOf/>
-          <dgm:constrLst>
-            <dgm:constr type="bendDist" for="des" ptType="parTrans" refType="sp" fact="0.5"/>
-          </dgm:constrLst>
-          <dgm:ruleLst/>
-          <dgm:layoutNode name="composite">
-            <dgm:alg type="composite"/>
-            <dgm:shape xmlns:r="http://schemas.openxmlformats.org/officeDocument/2006/relationships" r:blip="">
-              <dgm:adjLst/>
-            </dgm:shape>
-            <dgm:presOf/>
-            <dgm:constrLst>
-              <dgm:constr type="w" for="ch" forName="background" refType="w" fact="0.9"/>
-              <dgm:constr type="h" for="ch" forName="background" refType="w" refFor="ch" refForName="background" fact="0.635"/>
-              <dgm:constr type="t" for="ch" forName="background"/>
-              <dgm:constr type="l" for="ch" forName="background"/>
-              <dgm:constr type="w" for="ch" forName="text" refType="w" fact="0.9"/>
-              <dgm:constr type="h" for="ch" forName="text" refType="w" refFor="ch" refForName="text" fact="0.635"/>
-              <dgm:constr type="t" for="ch" forName="text" refType="w" fact="0.095"/>
-              <dgm:constr type="l" for="ch" forName="text" refType="w" fact="0.1"/>
-            </dgm:constrLst>
-            <dgm:ruleLst/>
-            <dgm:layoutNode name="background" styleLbl="node0" moveWith="text">
-              <dgm:alg type="sp"/>
-              <dgm:shape xmlns:r="http://schemas.openxmlformats.org/officeDocument/2006/relationships" type="roundRect" r:blip="">
-                <dgm:adjLst>
-                  <dgm:adj idx="1" val="0.1"/>
-                </dgm:adjLst>
-              </dgm:shape>
-              <dgm:presOf/>
-              <dgm:constrLst/>
-              <dgm:ruleLst/>
-            </dgm:layoutNode>
-            <dgm:layoutNode name="text" styleLbl="fgAcc0">
-              <dgm:varLst>
-                <dgm:chPref val="3"/>
-              </dgm:varLst>
-              <dgm:alg type="tx"/>
-              <dgm:shape xmlns:r="http://schemas.openxmlformats.org/officeDocument/2006/relationships" type="roundRect" r:blip="">
-                <dgm:adjLst>
-                  <dgm:adj idx="1" val="0.1"/>
-                </dgm:adjLst>
-              </dgm:shape>
-              <dgm:presOf axis="self"/>
-              <dgm:constrLst>
-                <dgm:constr type="tMarg" refType="primFontSz" fact="0.3"/>
-                <dgm:constr type="bMarg" refType="primFontSz" fact="0.3"/>
-                <dgm:constr type="lMarg" refType="primFontSz" fact="0.3"/>
-                <dgm:constr type="rMarg" refType="primFontSz" fact="0.3"/>
-              </dgm:constrLst>
-              <dgm:ruleLst>
-                <dgm:rule type="primFontSz" val="5" fact="NaN" max="NaN"/>
-              </dgm:ruleLst>
-            </dgm:layoutNode>
-          </dgm:layoutNode>
-          <dgm:layoutNode name="hierChild2">
-            <dgm:choose name="Name5">
-              <dgm:if name="Name6" func="var" arg="dir" op="equ" val="norm">
-                <dgm:alg type="hierChild">
-                  <dgm:param type="linDir" val="fromL"/>
-                </dgm:alg>
-              </dgm:if>
-              <dgm:else name="Name7">
-                <dgm:alg type="hierChild">
-                  <dgm:param type="linDir" val="fromR"/>
-                </dgm:alg>
-              </dgm:else>
-            </dgm:choose>
-            <dgm:shape xmlns:r="http://schemas.openxmlformats.org/officeDocument/2006/relationships" r:blip="">
-              <dgm:adjLst/>
-            </dgm:shape>
-            <dgm:presOf/>
-            <dgm:constrLst/>
-            <dgm:ruleLst/>
-            <dgm:forEach name="Name8" axis="ch">
-              <dgm:forEach name="Name9" axis="self" ptType="parTrans" cnt="1">
-                <dgm:layoutNode name="Name10">
-                  <dgm:alg type="conn">
-                    <dgm:param type="dim" val="1D"/>
-                    <dgm:param type="endSty" val="noArr"/>
-                    <dgm:param type="connRout" val="bend"/>
-                    <dgm:param type="bendPt" val="end"/>
-                    <dgm:param type="begPts" val="bCtr"/>
-                    <dgm:param type="endPts" val="tCtr"/>
-                    <dgm:param type="srcNode" val="background"/>
-                    <dgm:param type="dstNode" val="background2"/>
-                  </dgm:alg>
-                  <dgm:shape xmlns:r="http://schemas.openxmlformats.org/officeDocument/2006/relationships" type="conn" r:blip="" zOrderOff="-999">
-                    <dgm:adjLst/>
-                  </dgm:shape>
-                  <dgm:presOf axis="self"/>
-                  <dgm:constrLst>
-                    <dgm:constr type="begPad"/>
-                    <dgm:constr type="endPad"/>
-                  </dgm:constrLst>
-                  <dgm:ruleLst/>
-                </dgm:layoutNode>
-              </dgm:forEach>
-              <dgm:forEach name="Name11" axis="self" ptType="node">
-                <dgm:layoutNode name="hierRoot2">
-                  <dgm:alg type="hierRoot"/>
-                  <dgm:shape xmlns:r="http://schemas.openxmlformats.org/officeDocument/2006/relationships" r:blip="">
-                    <dgm:adjLst/>
-                  </dgm:shape>
-                  <dgm:presOf/>
-                  <dgm:constrLst>
-                    <dgm:constr type="bendDist" for="des" ptType="parTrans" refType="sp" fact="0.5"/>
-                  </dgm:constrLst>
-                  <dgm:ruleLst/>
-                  <dgm:layoutNode name="composite2">
-                    <dgm:alg type="composite"/>
-                    <dgm:shape xmlns:r="http://schemas.openxmlformats.org/officeDocument/2006/relationships" r:blip="">
-                      <dgm:adjLst/>
-                    </dgm:shape>
-                    <dgm:presOf/>
-                    <dgm:constrLst>
-                      <dgm:constr type="w" for="ch" forName="background2" refType="w" fact="0.9"/>
-                      <dgm:constr type="h" for="ch" forName="background2" refType="w" refFor="ch" refForName="background2" fact="0.635"/>
-                      <dgm:constr type="t" for="ch" forName="background2"/>
-                      <dgm:constr type="l" for="ch" forName="background2"/>
-                      <dgm:constr type="w" for="ch" forName="text2" refType="w" fact="0.9"/>
-                      <dgm:constr type="h" for="ch" forName="text2" refType="w" refFor="ch" refForName="text2" fact="0.635"/>
-                      <dgm:constr type="t" for="ch" forName="text2" refType="w" fact="0.095"/>
-                      <dgm:constr type="l" for="ch" forName="text2" refType="w" fact="0.1"/>
-                    </dgm:constrLst>
-                    <dgm:ruleLst/>
-                    <dgm:layoutNode name="background2" moveWith="text2">
-                      <dgm:alg type="sp"/>
-                      <dgm:shape xmlns:r="http://schemas.openxmlformats.org/officeDocument/2006/relationships" type="roundRect" r:blip="">
-                        <dgm:adjLst>
-                          <dgm:adj idx="1" val="0.1"/>
-                        </dgm:adjLst>
-                      </dgm:shape>
-                      <dgm:presOf/>
-                      <dgm:constrLst/>
-                      <dgm:ruleLst/>
-                    </dgm:layoutNode>
-                    <dgm:layoutNode name="text2" styleLbl="fgAcc2">
-                      <dgm:varLst>
-                        <dgm:chPref val="3"/>
-                      </dgm:varLst>
-                      <dgm:alg type="tx"/>
-                      <dgm:shape xmlns:r="http://schemas.openxmlformats.org/officeDocument/2006/relationships" type="roundRect" r:blip="">
-                        <dgm:adjLst>
-                          <dgm:adj idx="1" val="0.1"/>
-                        </dgm:adjLst>
-                      </dgm:shape>
-                      <dgm:presOf axis="self"/>
-                      <dgm:constrLst>
-                        <dgm:constr type="tMarg" refType="primFontSz" fact="0.3"/>
-                        <dgm:constr type="bMarg" refType="primFontSz" fact="0.3"/>
-                        <dgm:constr type="lMarg" refType="primFontSz" fact="0.3"/>
-                        <dgm:constr type="rMarg" refType="primFontSz" fact="0.3"/>
-                      </dgm:constrLst>
-                      <dgm:ruleLst>
-                        <dgm:rule type="primFontSz" val="5" fact="NaN" max="NaN"/>
-                      </dgm:ruleLst>
-                    </dgm:layoutNode>
-                  </dgm:layoutNode>
-                  <dgm:layoutNode name="hierChild3">
-                    <dgm:choose name="Name12">
-                      <dgm:if name="Name13" func="var" arg="dir" op="equ" val="norm">
-                        <dgm:alg type="hierChild">
-                          <dgm:param type="linDir" val="fromL"/>
-                        </dgm:alg>
-                      </dgm:if>
-                      <dgm:else name="Name14">
-                        <dgm:alg type="hierChild">
-                          <dgm:param type="linDir" val="fromR"/>
-                        </dgm:alg>
-                      </dgm:else>
-                    </dgm:choose>
-                    <dgm:shape xmlns:r="http://schemas.openxmlformats.org/officeDocument/2006/relationships" r:blip="">
-                      <dgm:adjLst/>
-                    </dgm:shape>
-                    <dgm:presOf/>
-                    <dgm:constrLst/>
-                    <dgm:ruleLst/>
-                    <dgm:forEach name="Name15" axis="ch">
-                      <dgm:forEach name="Name16" axis="self" ptType="parTrans" cnt="1">
-                        <dgm:layoutNode name="Name17">
-                          <dgm:alg type="conn">
-                            <dgm:param type="dim" val="1D"/>
-                            <dgm:param type="endSty" val="noArr"/>
-                            <dgm:param type="connRout" val="bend"/>
-                            <dgm:param type="bendPt" val="end"/>
-                            <dgm:param type="begPts" val="bCtr"/>
-                            <dgm:param type="endPts" val="tCtr"/>
-                            <dgm:param type="srcNode" val="background2"/>
-                            <dgm:param type="dstNode" val="background3"/>
-                          </dgm:alg>
-                          <dgm:shape xmlns:r="http://schemas.openxmlformats.org/officeDocument/2006/relationships" type="conn" r:blip="" zOrderOff="-999">
-                            <dgm:adjLst/>
-                          </dgm:shape>
-                          <dgm:presOf axis="self"/>
-                          <dgm:constrLst>
-                            <dgm:constr type="begPad"/>
-                            <dgm:constr type="endPad"/>
-                          </dgm:constrLst>
-                          <dgm:ruleLst/>
-                        </dgm:layoutNode>
-                      </dgm:forEach>
-                      <dgm:forEach name="Name18" axis="self" ptType="node">
-                        <dgm:layoutNode name="hierRoot3">
-                          <dgm:alg type="hierRoot"/>
-                          <dgm:shape xmlns:r="http://schemas.openxmlformats.org/officeDocument/2006/relationships" r:blip="">
-                            <dgm:adjLst/>
-                          </dgm:shape>
-                          <dgm:presOf/>
-                          <dgm:constrLst>
-                            <dgm:constr type="bendDist" for="des" ptType="parTrans" refType="sp" fact="0.5"/>
-                          </dgm:constrLst>
-                          <dgm:ruleLst/>
-                          <dgm:layoutNode name="composite3">
-                            <dgm:alg type="composite"/>
-                            <dgm:shape xmlns:r="http://schemas.openxmlformats.org/officeDocument/2006/relationships" r:blip="">
-                              <dgm:adjLst/>
-                            </dgm:shape>
-                            <dgm:presOf/>
-                            <dgm:constrLst>
-                              <dgm:constr type="w" for="ch" forName="background3" refType="w" fact="0.9"/>
-                              <dgm:constr type="h" for="ch" forName="background3" refType="w" refFor="ch" refForName="background3" fact="0.635"/>
-                              <dgm:constr type="t" for="ch" forName="background3"/>
-                              <dgm:constr type="l" for="ch" forName="background3"/>
-                              <dgm:constr type="w" for="ch" forName="text3" refType="w" fact="0.9"/>
-                              <dgm:constr type="h" for="ch" forName="text3" refType="w" refFor="ch" refForName="text3" fact="0.635"/>
-                              <dgm:constr type="t" for="ch" forName="text3" refType="w" fact="0.095"/>
-                              <dgm:constr type="l" for="ch" forName="text3" refType="w" fact="0.1"/>
-                            </dgm:constrLst>
-                            <dgm:ruleLst/>
-                            <dgm:layoutNode name="background3" moveWith="text3">
-                              <dgm:alg type="sp"/>
-                              <dgm:shape xmlns:r="http://schemas.openxmlformats.org/officeDocument/2006/relationships" type="roundRect" r:blip="">
-                                <dgm:adjLst>
-                                  <dgm:adj idx="1" val="0.1"/>
-                                </dgm:adjLst>
-                              </dgm:shape>
-                              <dgm:presOf/>
-                              <dgm:constrLst/>
-                              <dgm:ruleLst/>
-                            </dgm:layoutNode>
-                            <dgm:layoutNode name="text3" styleLbl="fgAcc3">
-                              <dgm:varLst>
-                                <dgm:chPref val="3"/>
-                              </dgm:varLst>
-                              <dgm:alg type="tx"/>
-                              <dgm:shape xmlns:r="http://schemas.openxmlformats.org/officeDocument/2006/relationships" type="roundRect" r:blip="">
-                                <dgm:adjLst>
-                                  <dgm:adj idx="1" val="0.1"/>
-                                </dgm:adjLst>
-                              </dgm:shape>
-                              <dgm:presOf axis="self"/>
-                              <dgm:constrLst>
-                                <dgm:constr type="tMarg" refType="primFontSz" fact="0.3"/>
-                                <dgm:constr type="bMarg" refType="primFontSz" fact="0.3"/>
-                                <dgm:constr type="lMarg" refType="primFontSz" fact="0.3"/>
-                                <dgm:constr type="rMarg" refType="primFontSz" fact="0.3"/>
-                              </dgm:constrLst>
-                              <dgm:ruleLst>
-                                <dgm:rule type="primFontSz" val="5" fact="NaN" max="NaN"/>
-                              </dgm:ruleLst>
-                            </dgm:layoutNode>
-                          </dgm:layoutNode>
-                          <dgm:layoutNode name="hierChild4">
-                            <dgm:choose name="Name19">
-                              <dgm:if name="Name20" func="var" arg="dir" op="equ" val="norm">
-                                <dgm:alg type="hierChild">
-                                  <dgm:param type="linDir" val="fromL"/>
-                                </dgm:alg>
-                              </dgm:if>
-                              <dgm:else name="Name21">
-                                <dgm:alg type="hierChild">
-                                  <dgm:param type="linDir" val="fromR"/>
-                                </dgm:alg>
-                              </dgm:else>
-                            </dgm:choose>
-                            <dgm:shape xmlns:r="http://schemas.openxmlformats.org/officeDocument/2006/relationships" r:blip="">
-                              <dgm:adjLst/>
-                            </dgm:shape>
-                            <dgm:presOf/>
-                            <dgm:constrLst/>
-                            <dgm:ruleLst/>
-                            <dgm:forEach name="repeat" axis="ch">
-                              <dgm:forEach name="Name22" axis="self" ptType="parTrans" cnt="1">
-                                <dgm:layoutNode name="Name23">
-                                  <dgm:choose name="Name24">
-                                    <dgm:if name="Name25" axis="self" func="depth" op="lte" val="4">
-                                      <dgm:alg type="conn">
-                                        <dgm:param type="dim" val="1D"/>
-                                        <dgm:param type="endSty" val="noArr"/>
-                                        <dgm:param type="connRout" val="bend"/>
-                                        <dgm:param type="bendPt" val="end"/>
-                                        <dgm:param type="begPts" val="bCtr"/>
-                                        <dgm:param type="endPts" val="tCtr"/>
-                                        <dgm:param type="srcNode" val="background3"/>
-                                        <dgm:param type="dstNode" val="background4"/>
-                                      </dgm:alg>
-                                    </dgm:if>
-                                    <dgm:else name="Name26">
-                                      <dgm:alg type="conn">
-                                        <dgm:param type="dim" val="1D"/>
-                                        <dgm:param type="endSty" val="noArr"/>
-                                        <dgm:param type="connRout" val="bend"/>
-                                        <dgm:param type="bendPt" val="end"/>
-                                        <dgm:param type="begPts" val="bCtr"/>
-                                        <dgm:param type="endPts" val="tCtr"/>
-                                        <dgm:param type="srcNode" val="background4"/>
-                                        <dgm:param type="dstNode" val="background4"/>
-                                      </dgm:alg>
-                                    </dgm:else>
-                                  </dgm:choose>
-                                  <dgm:shape xmlns:r="http://schemas.openxmlformats.org/officeDocument/2006/relationships" type="conn" r:blip="" zOrderOff="-999">
-                                    <dgm:adjLst/>
-                                  </dgm:shape>
-                                  <dgm:presOf axis="self"/>
-                                  <dgm:constrLst>
-                                    <dgm:constr type="begPad"/>
-                                    <dgm:constr type="endPad"/>
-                                  </dgm:constrLst>
-                                  <dgm:ruleLst/>
-                                </dgm:layoutNode>
-                              </dgm:forEach>
-                              <dgm:forEach name="Name27" axis="self" ptType="node">
-                                <dgm:layoutNode name="hierRoot4">
-                                  <dgm:alg type="hierRoot"/>
-                                  <dgm:shape xmlns:r="http://schemas.openxmlformats.org/officeDocument/2006/relationships" r:blip="">
-                                    <dgm:adjLst/>
-                                  </dgm:shape>
-                                  <dgm:presOf/>
-                                  <dgm:constrLst>
-                                    <dgm:constr type="bendDist" for="des" ptType="parTrans" refType="sp" fact="0.5"/>
-                                  </dgm:constrLst>
-                                  <dgm:ruleLst/>
-                                  <dgm:layoutNode name="composite4">
-                                    <dgm:alg type="composite"/>
-                                    <dgm:shape xmlns:r="http://schemas.openxmlformats.org/officeDocument/2006/relationships" r:blip="">
-                                      <dgm:adjLst/>
-                                    </dgm:shape>
-                                    <dgm:presOf/>
-                                    <dgm:constrLst>
-                                      <dgm:constr type="w" for="ch" forName="background4" refType="w" fact="0.9"/>
-                                      <dgm:constr type="h" for="ch" forName="background4" refType="w" refFor="ch" refForName="background4" fact="0.635"/>
-                                      <dgm:constr type="t" for="ch" forName="background4"/>
-                                      <dgm:constr type="l" for="ch" forName="background4"/>
-                                      <dgm:constr type="w" for="ch" forName="text4" refType="w" fact="0.9"/>
-                                      <dgm:constr type="h" for="ch" forName="text4" refType="w" refFor="ch" refForName="text4" fact="0.635"/>
-                                      <dgm:constr type="t" for="ch" forName="text4" refType="w" fact="0.095"/>
-                                      <dgm:constr type="l" for="ch" forName="text4" refType="w" fact="0.1"/>
-                                    </dgm:constrLst>
-                                    <dgm:ruleLst/>
-                                    <dgm:layoutNode name="background4" moveWith="text4">
-                                      <dgm:alg type="sp"/>
-                                      <dgm:shape xmlns:r="http://schemas.openxmlformats.org/officeDocument/2006/relationships" type="roundRect" r:blip="">
-                                        <dgm:adjLst>
-                                          <dgm:adj idx="1" val="0.1"/>
-                                        </dgm:adjLst>
-                                      </dgm:shape>
-                                      <dgm:presOf/>
-                                      <dgm:constrLst/>
-                                      <dgm:ruleLst/>
-                                    </dgm:layoutNode>
-                                    <dgm:layoutNode name="text4" styleLbl="fgAcc4">
-                                      <dgm:varLst>
-                                        <dgm:chPref val="3"/>
-                                      </dgm:varLst>
-                                      <dgm:alg type="tx"/>
-                                      <dgm:shape xmlns:r="http://schemas.openxmlformats.org/officeDocument/2006/relationships" type="roundRect" r:blip="">
-                                        <dgm:adjLst>
-                                          <dgm:adj idx="1" val="0.1"/>
-                                        </dgm:adjLst>
-                                      </dgm:shape>
-                                      <dgm:presOf axis="self"/>
-                                      <dgm:constrLst>
-                                        <dgm:constr type="tMarg" refType="primFontSz" fact="0.3"/>
-                                        <dgm:constr type="bMarg" refType="primFontSz" fact="0.3"/>
-                                        <dgm:constr type="lMarg" refType="primFontSz" fact="0.3"/>
-                                        <dgm:constr type="rMarg" refType="primFontSz" fact="0.3"/>
-                                      </dgm:constrLst>
-                                      <dgm:ruleLst>
-                                        <dgm:rule type="primFontSz" val="5" fact="NaN" max="NaN"/>
-                                      </dgm:ruleLst>
-                                    </dgm:layoutNode>
-                                  </dgm:layoutNode>
-                                  <dgm:layoutNode name="hierChild5">
-                                    <dgm:choose name="Name28">
-                                      <dgm:if name="Name29" func="var" arg="dir" op="equ" val="norm">
-                                        <dgm:alg type="hierChild">
-                                          <dgm:param type="linDir" val="fromL"/>
-                                        </dgm:alg>
-                                      </dgm:if>
-                                      <dgm:else name="Name30">
-                                        <dgm:alg type="hierChild">
-                                          <dgm:param type="linDir" val="fromR"/>
-                                        </dgm:alg>
-                                      </dgm:else>
-                                    </dgm:choose>
-                                    <dgm:shape xmlns:r="http://schemas.openxmlformats.org/officeDocument/2006/relationships" r:blip="">
-                                      <dgm:adjLst/>
-                                    </dgm:shape>
-                                    <dgm:presOf/>
-                                    <dgm:constrLst/>
-                                    <dgm:ruleLst/>
-                                    <dgm:forEach name="Name31" ref="repeat"/>
-                                  </dgm:layoutNode>
-                                </dgm:layoutNode>
-                              </dgm:forEach>
-                            </dgm:forEach>
-                          </dgm:layoutNode>
-                        </dgm:layoutNode>
-                      </dgm:forEach>
-                    </dgm:forEach>
-                  </dgm:layoutNode>
-                </dgm:layoutNode>
-              </dgm:forEach>
-            </dgm:forEach>
-          </dgm:layoutNode>
-        </dgm:layoutNode>
-      </dgm:forEach>
-    </dgm:forEach>
-  </dgm:layoutNode>
-</dgm:layoutDef>
-</file>
-
 <file path=ppt/diagrams/quickStyle1.xml><?xml version="1.0" encoding="utf-8"?>
 <dgm:styleDef xmlns:dgm="http://schemas.openxmlformats.org/drawingml/2006/diagram" xmlns:a="http://schemas.openxmlformats.org/drawingml/2006/main" uniqueId="urn:microsoft.com/office/officeart/2005/8/quickstyle/simple1">
   <dgm:title val=""/>
@@ -10100,1040 +8336,6 @@
 </file>
 
 <file path=ppt/diagrams/quickStyle3.xml><?xml version="1.0" encoding="utf-8"?>
-<dgm:styleDef xmlns:dgm="http://schemas.openxmlformats.org/drawingml/2006/diagram" xmlns:a="http://schemas.openxmlformats.org/drawingml/2006/main" uniqueId="urn:microsoft.com/office/officeart/2005/8/quickstyle/simple1">
-  <dgm:title val=""/>
-  <dgm:desc val=""/>
-  <dgm:catLst>
-    <dgm:cat type="simple" pri="10100"/>
-  </dgm:catLst>
-  <dgm:scene3d>
-    <a:camera prst="orthographicFront"/>
-    <a:lightRig rig="threePt" dir="t"/>
-  </dgm:scene3d>
-  <dgm:styleLbl name="node0">
-    <dgm:scene3d>
-      <a:camera prst="orthographicFront"/>
-      <a:lightRig rig="threePt" dir="t"/>
-    </dgm:scene3d>
-    <dgm:sp3d/>
-    <dgm:txPr/>
-    <dgm:style>
-      <a:lnRef idx="2">
-        <a:scrgbClr r="0" g="0" b="0"/>
-      </a:lnRef>
-      <a:fillRef idx="1">
-        <a:scrgbClr r="0" g="0" b="0"/>
-      </a:fillRef>
-      <a:effectRef idx="0">
-        <a:scrgbClr r="0" g="0" b="0"/>
-      </a:effectRef>
-      <a:fontRef idx="minor">
-        <a:schemeClr val="lt1"/>
-      </a:fontRef>
-    </dgm:style>
-  </dgm:styleLbl>
-  <dgm:styleLbl name="lnNode1">
-    <dgm:scene3d>
-      <a:camera prst="orthographicFront"/>
-      <a:lightRig rig="threePt" dir="t"/>
-    </dgm:scene3d>
-    <dgm:sp3d/>
-    <dgm:txPr/>
-    <dgm:style>
-      <a:lnRef idx="2">
-        <a:scrgbClr r="0" g="0" b="0"/>
-      </a:lnRef>
-      <a:fillRef idx="1">
-        <a:scrgbClr r="0" g="0" b="0"/>
-      </a:fillRef>
-      <a:effectRef idx="0">
-        <a:scrgbClr r="0" g="0" b="0"/>
-      </a:effectRef>
-      <a:fontRef idx="minor">
-        <a:schemeClr val="lt1"/>
-      </a:fontRef>
-    </dgm:style>
-  </dgm:styleLbl>
-  <dgm:styleLbl name="vennNode1">
-    <dgm:scene3d>
-      <a:camera prst="orthographicFront"/>
-      <a:lightRig rig="threePt" dir="t"/>
-    </dgm:scene3d>
-    <dgm:sp3d/>
-    <dgm:txPr/>
-    <dgm:style>
-      <a:lnRef idx="2">
-        <a:scrgbClr r="0" g="0" b="0"/>
-      </a:lnRef>
-      <a:fillRef idx="1">
-        <a:scrgbClr r="0" g="0" b="0"/>
-      </a:fillRef>
-      <a:effectRef idx="0">
-        <a:scrgbClr r="0" g="0" b="0"/>
-      </a:effectRef>
-      <a:fontRef idx="minor">
-        <a:schemeClr val="tx1"/>
-      </a:fontRef>
-    </dgm:style>
-  </dgm:styleLbl>
-  <dgm:styleLbl name="alignNode1">
-    <dgm:scene3d>
-      <a:camera prst="orthographicFront"/>
-      <a:lightRig rig="threePt" dir="t"/>
-    </dgm:scene3d>
-    <dgm:sp3d/>
-    <dgm:txPr/>
-    <dgm:style>
-      <a:lnRef idx="2">
-        <a:scrgbClr r="0" g="0" b="0"/>
-      </a:lnRef>
-      <a:fillRef idx="1">
-        <a:scrgbClr r="0" g="0" b="0"/>
-      </a:fillRef>
-      <a:effectRef idx="0">
-        <a:scrgbClr r="0" g="0" b="0"/>
-      </a:effectRef>
-      <a:fontRef idx="minor">
-        <a:schemeClr val="lt1"/>
-      </a:fontRef>
-    </dgm:style>
-  </dgm:styleLbl>
-  <dgm:styleLbl name="node1">
-    <dgm:scene3d>
-      <a:camera prst="orthographicFront"/>
-      <a:lightRig rig="threePt" dir="t"/>
-    </dgm:scene3d>
-    <dgm:sp3d/>
-    <dgm:txPr/>
-    <dgm:style>
-      <a:lnRef idx="2">
-        <a:scrgbClr r="0" g="0" b="0"/>
-      </a:lnRef>
-      <a:fillRef idx="1">
-        <a:scrgbClr r="0" g="0" b="0"/>
-      </a:fillRef>
-      <a:effectRef idx="0">
-        <a:scrgbClr r="0" g="0" b="0"/>
-      </a:effectRef>
-      <a:fontRef idx="minor">
-        <a:schemeClr val="lt1"/>
-      </a:fontRef>
-    </dgm:style>
-  </dgm:styleLbl>
-  <dgm:styleLbl name="node2">
-    <dgm:scene3d>
-      <a:camera prst="orthographicFront"/>
-      <a:lightRig rig="threePt" dir="t"/>
-    </dgm:scene3d>
-    <dgm:sp3d/>
-    <dgm:txPr/>
-    <dgm:style>
-      <a:lnRef idx="2">
-        <a:scrgbClr r="0" g="0" b="0"/>
-      </a:lnRef>
-      <a:fillRef idx="1">
-        <a:scrgbClr r="0" g="0" b="0"/>
-      </a:fillRef>
-      <a:effectRef idx="0">
-        <a:scrgbClr r="0" g="0" b="0"/>
-      </a:effectRef>
-      <a:fontRef idx="minor">
-        <a:schemeClr val="lt1"/>
-      </a:fontRef>
-    </dgm:style>
-  </dgm:styleLbl>
-  <dgm:styleLbl name="node3">
-    <dgm:scene3d>
-      <a:camera prst="orthographicFront"/>
-      <a:lightRig rig="threePt" dir="t"/>
-    </dgm:scene3d>
-    <dgm:sp3d/>
-    <dgm:txPr/>
-    <dgm:style>
-      <a:lnRef idx="2">
-        <a:scrgbClr r="0" g="0" b="0"/>
-      </a:lnRef>
-      <a:fillRef idx="1">
-        <a:scrgbClr r="0" g="0" b="0"/>
-      </a:fillRef>
-      <a:effectRef idx="0">
-        <a:scrgbClr r="0" g="0" b="0"/>
-      </a:effectRef>
-      <a:fontRef idx="minor">
-        <a:schemeClr val="lt1"/>
-      </a:fontRef>
-    </dgm:style>
-  </dgm:styleLbl>
-  <dgm:styleLbl name="node4">
-    <dgm:scene3d>
-      <a:camera prst="orthographicFront"/>
-      <a:lightRig rig="threePt" dir="t"/>
-    </dgm:scene3d>
-    <dgm:sp3d/>
-    <dgm:txPr/>
-    <dgm:style>
-      <a:lnRef idx="2">
-        <a:scrgbClr r="0" g="0" b="0"/>
-      </a:lnRef>
-      <a:fillRef idx="1">
-        <a:scrgbClr r="0" g="0" b="0"/>
-      </a:fillRef>
-      <a:effectRef idx="0">
-        <a:scrgbClr r="0" g="0" b="0"/>
-      </a:effectRef>
-      <a:fontRef idx="minor">
-        <a:schemeClr val="lt1"/>
-      </a:fontRef>
-    </dgm:style>
-  </dgm:styleLbl>
-  <dgm:styleLbl name="fgImgPlace1">
-    <dgm:scene3d>
-      <a:camera prst="orthographicFront"/>
-      <a:lightRig rig="threePt" dir="t"/>
-    </dgm:scene3d>
-    <dgm:sp3d/>
-    <dgm:txPr/>
-    <dgm:style>
-      <a:lnRef idx="2">
-        <a:scrgbClr r="0" g="0" b="0"/>
-      </a:lnRef>
-      <a:fillRef idx="1">
-        <a:scrgbClr r="0" g="0" b="0"/>
-      </a:fillRef>
-      <a:effectRef idx="0">
-        <a:scrgbClr r="0" g="0" b="0"/>
-      </a:effectRef>
-      <a:fontRef idx="minor"/>
-    </dgm:style>
-  </dgm:styleLbl>
-  <dgm:styleLbl name="alignImgPlace1">
-    <dgm:scene3d>
-      <a:camera prst="orthographicFront"/>
-      <a:lightRig rig="threePt" dir="t"/>
-    </dgm:scene3d>
-    <dgm:sp3d/>
-    <dgm:txPr/>
-    <dgm:style>
-      <a:lnRef idx="2">
-        <a:scrgbClr r="0" g="0" b="0"/>
-      </a:lnRef>
-      <a:fillRef idx="1">
-        <a:scrgbClr r="0" g="0" b="0"/>
-      </a:fillRef>
-      <a:effectRef idx="0">
-        <a:scrgbClr r="0" g="0" b="0"/>
-      </a:effectRef>
-      <a:fontRef idx="minor"/>
-    </dgm:style>
-  </dgm:styleLbl>
-  <dgm:styleLbl name="bgImgPlace1">
-    <dgm:scene3d>
-      <a:camera prst="orthographicFront"/>
-      <a:lightRig rig="threePt" dir="t"/>
-    </dgm:scene3d>
-    <dgm:sp3d/>
-    <dgm:txPr/>
-    <dgm:style>
-      <a:lnRef idx="2">
-        <a:scrgbClr r="0" g="0" b="0"/>
-      </a:lnRef>
-      <a:fillRef idx="1">
-        <a:scrgbClr r="0" g="0" b="0"/>
-      </a:fillRef>
-      <a:effectRef idx="0">
-        <a:scrgbClr r="0" g="0" b="0"/>
-      </a:effectRef>
-      <a:fontRef idx="minor"/>
-    </dgm:style>
-  </dgm:styleLbl>
-  <dgm:styleLbl name="sibTrans2D1">
-    <dgm:scene3d>
-      <a:camera prst="orthographicFront"/>
-      <a:lightRig rig="threePt" dir="t"/>
-    </dgm:scene3d>
-    <dgm:sp3d/>
-    <dgm:txPr/>
-    <dgm:style>
-      <a:lnRef idx="0">
-        <a:scrgbClr r="0" g="0" b="0"/>
-      </a:lnRef>
-      <a:fillRef idx="1">
-        <a:scrgbClr r="0" g="0" b="0"/>
-      </a:fillRef>
-      <a:effectRef idx="0">
-        <a:scrgbClr r="0" g="0" b="0"/>
-      </a:effectRef>
-      <a:fontRef idx="minor">
-        <a:schemeClr val="lt1"/>
-      </a:fontRef>
-    </dgm:style>
-  </dgm:styleLbl>
-  <dgm:styleLbl name="fgSibTrans2D1">
-    <dgm:scene3d>
-      <a:camera prst="orthographicFront"/>
-      <a:lightRig rig="threePt" dir="t"/>
-    </dgm:scene3d>
-    <dgm:sp3d/>
-    <dgm:txPr/>
-    <dgm:style>
-      <a:lnRef idx="0">
-        <a:scrgbClr r="0" g="0" b="0"/>
-      </a:lnRef>
-      <a:fillRef idx="1">
-        <a:scrgbClr r="0" g="0" b="0"/>
-      </a:fillRef>
-      <a:effectRef idx="0">
-        <a:scrgbClr r="0" g="0" b="0"/>
-      </a:effectRef>
-      <a:fontRef idx="minor">
-        <a:schemeClr val="lt1"/>
-      </a:fontRef>
-    </dgm:style>
-  </dgm:styleLbl>
-  <dgm:styleLbl name="bgSibTrans2D1">
-    <dgm:scene3d>
-      <a:camera prst="orthographicFront"/>
-      <a:lightRig rig="threePt" dir="t"/>
-    </dgm:scene3d>
-    <dgm:sp3d/>
-    <dgm:txPr/>
-    <dgm:style>
-      <a:lnRef idx="0">
-        <a:scrgbClr r="0" g="0" b="0"/>
-      </a:lnRef>
-      <a:fillRef idx="1">
-        <a:scrgbClr r="0" g="0" b="0"/>
-      </a:fillRef>
-      <a:effectRef idx="0">
-        <a:scrgbClr r="0" g="0" b="0"/>
-      </a:effectRef>
-      <a:fontRef idx="minor">
-        <a:schemeClr val="lt1"/>
-      </a:fontRef>
-    </dgm:style>
-  </dgm:styleLbl>
-  <dgm:styleLbl name="sibTrans1D1">
-    <dgm:scene3d>
-      <a:camera prst="orthographicFront"/>
-      <a:lightRig rig="threePt" dir="t"/>
-    </dgm:scene3d>
-    <dgm:sp3d/>
-    <dgm:txPr/>
-    <dgm:style>
-      <a:lnRef idx="1">
-        <a:scrgbClr r="0" g="0" b="0"/>
-      </a:lnRef>
-      <a:fillRef idx="0">
-        <a:scrgbClr r="0" g="0" b="0"/>
-      </a:fillRef>
-      <a:effectRef idx="0">
-        <a:scrgbClr r="0" g="0" b="0"/>
-      </a:effectRef>
-      <a:fontRef idx="minor"/>
-    </dgm:style>
-  </dgm:styleLbl>
-  <dgm:styleLbl name="callout">
-    <dgm:scene3d>
-      <a:camera prst="orthographicFront"/>
-      <a:lightRig rig="threePt" dir="t"/>
-    </dgm:scene3d>
-    <dgm:sp3d/>
-    <dgm:txPr/>
-    <dgm:style>
-      <a:lnRef idx="2">
-        <a:scrgbClr r="0" g="0" b="0"/>
-      </a:lnRef>
-      <a:fillRef idx="1">
-        <a:scrgbClr r="0" g="0" b="0"/>
-      </a:fillRef>
-      <a:effectRef idx="0">
-        <a:scrgbClr r="0" g="0" b="0"/>
-      </a:effectRef>
-      <a:fontRef idx="minor"/>
-    </dgm:style>
-  </dgm:styleLbl>
-  <dgm:styleLbl name="asst0">
-    <dgm:scene3d>
-      <a:camera prst="orthographicFront"/>
-      <a:lightRig rig="threePt" dir="t"/>
-    </dgm:scene3d>
-    <dgm:sp3d/>
-    <dgm:txPr/>
-    <dgm:style>
-      <a:lnRef idx="2">
-        <a:scrgbClr r="0" g="0" b="0"/>
-      </a:lnRef>
-      <a:fillRef idx="1">
-        <a:scrgbClr r="0" g="0" b="0"/>
-      </a:fillRef>
-      <a:effectRef idx="0">
-        <a:scrgbClr r="0" g="0" b="0"/>
-      </a:effectRef>
-      <a:fontRef idx="minor">
-        <a:schemeClr val="lt1"/>
-      </a:fontRef>
-    </dgm:style>
-  </dgm:styleLbl>
-  <dgm:styleLbl name="asst1">
-    <dgm:scene3d>
-      <a:camera prst="orthographicFront"/>
-      <a:lightRig rig="threePt" dir="t"/>
-    </dgm:scene3d>
-    <dgm:sp3d/>
-    <dgm:txPr/>
-    <dgm:style>
-      <a:lnRef idx="2">
-        <a:scrgbClr r="0" g="0" b="0"/>
-      </a:lnRef>
-      <a:fillRef idx="1">
-        <a:scrgbClr r="0" g="0" b="0"/>
-      </a:fillRef>
-      <a:effectRef idx="0">
-        <a:scrgbClr r="0" g="0" b="0"/>
-      </a:effectRef>
-      <a:fontRef idx="minor">
-        <a:schemeClr val="lt1"/>
-      </a:fontRef>
-    </dgm:style>
-  </dgm:styleLbl>
-  <dgm:styleLbl name="asst2">
-    <dgm:scene3d>
-      <a:camera prst="orthographicFront"/>
-      <a:lightRig rig="threePt" dir="t"/>
-    </dgm:scene3d>
-    <dgm:sp3d/>
-    <dgm:txPr/>
-    <dgm:style>
-      <a:lnRef idx="2">
-        <a:scrgbClr r="0" g="0" b="0"/>
-      </a:lnRef>
-      <a:fillRef idx="1">
-        <a:scrgbClr r="0" g="0" b="0"/>
-      </a:fillRef>
-      <a:effectRef idx="0">
-        <a:scrgbClr r="0" g="0" b="0"/>
-      </a:effectRef>
-      <a:fontRef idx="minor">
-        <a:schemeClr val="lt1"/>
-      </a:fontRef>
-    </dgm:style>
-  </dgm:styleLbl>
-  <dgm:styleLbl name="asst3">
-    <dgm:scene3d>
-      <a:camera prst="orthographicFront"/>
-      <a:lightRig rig="threePt" dir="t"/>
-    </dgm:scene3d>
-    <dgm:sp3d/>
-    <dgm:txPr/>
-    <dgm:style>
-      <a:lnRef idx="2">
-        <a:scrgbClr r="0" g="0" b="0"/>
-      </a:lnRef>
-      <a:fillRef idx="1">
-        <a:scrgbClr r="0" g="0" b="0"/>
-      </a:fillRef>
-      <a:effectRef idx="0">
-        <a:scrgbClr r="0" g="0" b="0"/>
-      </a:effectRef>
-      <a:fontRef idx="minor">
-        <a:schemeClr val="lt1"/>
-      </a:fontRef>
-    </dgm:style>
-  </dgm:styleLbl>
-  <dgm:styleLbl name="asst4">
-    <dgm:scene3d>
-      <a:camera prst="orthographicFront"/>
-      <a:lightRig rig="threePt" dir="t"/>
-    </dgm:scene3d>
-    <dgm:sp3d/>
-    <dgm:txPr/>
-    <dgm:style>
-      <a:lnRef idx="2">
-        <a:scrgbClr r="0" g="0" b="0"/>
-      </a:lnRef>
-      <a:fillRef idx="1">
-        <a:scrgbClr r="0" g="0" b="0"/>
-      </a:fillRef>
-      <a:effectRef idx="0">
-        <a:scrgbClr r="0" g="0" b="0"/>
-      </a:effectRef>
-      <a:fontRef idx="minor">
-        <a:schemeClr val="lt1"/>
-      </a:fontRef>
-    </dgm:style>
-  </dgm:styleLbl>
-  <dgm:styleLbl name="parChTrans2D1">
-    <dgm:scene3d>
-      <a:camera prst="orthographicFront"/>
-      <a:lightRig rig="threePt" dir="t"/>
-    </dgm:scene3d>
-    <dgm:sp3d/>
-    <dgm:txPr/>
-    <dgm:style>
-      <a:lnRef idx="2">
-        <a:scrgbClr r="0" g="0" b="0"/>
-      </a:lnRef>
-      <a:fillRef idx="1">
-        <a:scrgbClr r="0" g="0" b="0"/>
-      </a:fillRef>
-      <a:effectRef idx="0">
-        <a:scrgbClr r="0" g="0" b="0"/>
-      </a:effectRef>
-      <a:fontRef idx="minor">
-        <a:schemeClr val="lt1"/>
-      </a:fontRef>
-    </dgm:style>
-  </dgm:styleLbl>
-  <dgm:styleLbl name="parChTrans2D2">
-    <dgm:scene3d>
-      <a:camera prst="orthographicFront"/>
-      <a:lightRig rig="threePt" dir="t"/>
-    </dgm:scene3d>
-    <dgm:sp3d/>
-    <dgm:txPr/>
-    <dgm:style>
-      <a:lnRef idx="2">
-        <a:scrgbClr r="0" g="0" b="0"/>
-      </a:lnRef>
-      <a:fillRef idx="1">
-        <a:scrgbClr r="0" g="0" b="0"/>
-      </a:fillRef>
-      <a:effectRef idx="0">
-        <a:scrgbClr r="0" g="0" b="0"/>
-      </a:effectRef>
-      <a:fontRef idx="minor">
-        <a:schemeClr val="lt1"/>
-      </a:fontRef>
-    </dgm:style>
-  </dgm:styleLbl>
-  <dgm:styleLbl name="parChTrans2D3">
-    <dgm:scene3d>
-      <a:camera prst="orthographicFront"/>
-      <a:lightRig rig="threePt" dir="t"/>
-    </dgm:scene3d>
-    <dgm:sp3d/>
-    <dgm:txPr/>
-    <dgm:style>
-      <a:lnRef idx="2">
-        <a:scrgbClr r="0" g="0" b="0"/>
-      </a:lnRef>
-      <a:fillRef idx="1">
-        <a:scrgbClr r="0" g="0" b="0"/>
-      </a:fillRef>
-      <a:effectRef idx="0">
-        <a:scrgbClr r="0" g="0" b="0"/>
-      </a:effectRef>
-      <a:fontRef idx="minor">
-        <a:schemeClr val="lt1"/>
-      </a:fontRef>
-    </dgm:style>
-  </dgm:styleLbl>
-  <dgm:styleLbl name="parChTrans2D4">
-    <dgm:scene3d>
-      <a:camera prst="orthographicFront"/>
-      <a:lightRig rig="threePt" dir="t"/>
-    </dgm:scene3d>
-    <dgm:sp3d/>
-    <dgm:txPr/>
-    <dgm:style>
-      <a:lnRef idx="2">
-        <a:scrgbClr r="0" g="0" b="0"/>
-      </a:lnRef>
-      <a:fillRef idx="1">
-        <a:scrgbClr r="0" g="0" b="0"/>
-      </a:fillRef>
-      <a:effectRef idx="0">
-        <a:scrgbClr r="0" g="0" b="0"/>
-      </a:effectRef>
-      <a:fontRef idx="minor">
-        <a:schemeClr val="lt1"/>
-      </a:fontRef>
-    </dgm:style>
-  </dgm:styleLbl>
-  <dgm:styleLbl name="parChTrans1D1">
-    <dgm:scene3d>
-      <a:camera prst="orthographicFront"/>
-      <a:lightRig rig="threePt" dir="t"/>
-    </dgm:scene3d>
-    <dgm:sp3d/>
-    <dgm:txPr/>
-    <dgm:style>
-      <a:lnRef idx="2">
-        <a:scrgbClr r="0" g="0" b="0"/>
-      </a:lnRef>
-      <a:fillRef idx="0">
-        <a:scrgbClr r="0" g="0" b="0"/>
-      </a:fillRef>
-      <a:effectRef idx="0">
-        <a:scrgbClr r="0" g="0" b="0"/>
-      </a:effectRef>
-      <a:fontRef idx="minor"/>
-    </dgm:style>
-  </dgm:styleLbl>
-  <dgm:styleLbl name="parChTrans1D2">
-    <dgm:scene3d>
-      <a:camera prst="orthographicFront"/>
-      <a:lightRig rig="threePt" dir="t"/>
-    </dgm:scene3d>
-    <dgm:sp3d/>
-    <dgm:txPr/>
-    <dgm:style>
-      <a:lnRef idx="2">
-        <a:scrgbClr r="0" g="0" b="0"/>
-      </a:lnRef>
-      <a:fillRef idx="0">
-        <a:scrgbClr r="0" g="0" b="0"/>
-      </a:fillRef>
-      <a:effectRef idx="0">
-        <a:scrgbClr r="0" g="0" b="0"/>
-      </a:effectRef>
-      <a:fontRef idx="minor"/>
-    </dgm:style>
-  </dgm:styleLbl>
-  <dgm:styleLbl name="parChTrans1D3">
-    <dgm:scene3d>
-      <a:camera prst="orthographicFront"/>
-      <a:lightRig rig="threePt" dir="t"/>
-    </dgm:scene3d>
-    <dgm:sp3d/>
-    <dgm:txPr/>
-    <dgm:style>
-      <a:lnRef idx="2">
-        <a:scrgbClr r="0" g="0" b="0"/>
-      </a:lnRef>
-      <a:fillRef idx="0">
-        <a:scrgbClr r="0" g="0" b="0"/>
-      </a:fillRef>
-      <a:effectRef idx="0">
-        <a:scrgbClr r="0" g="0" b="0"/>
-      </a:effectRef>
-      <a:fontRef idx="minor"/>
-    </dgm:style>
-  </dgm:styleLbl>
-  <dgm:styleLbl name="parChTrans1D4">
-    <dgm:scene3d>
-      <a:camera prst="orthographicFront"/>
-      <a:lightRig rig="threePt" dir="t"/>
-    </dgm:scene3d>
-    <dgm:sp3d/>
-    <dgm:txPr/>
-    <dgm:style>
-      <a:lnRef idx="2">
-        <a:scrgbClr r="0" g="0" b="0"/>
-      </a:lnRef>
-      <a:fillRef idx="0">
-        <a:scrgbClr r="0" g="0" b="0"/>
-      </a:fillRef>
-      <a:effectRef idx="0">
-        <a:scrgbClr r="0" g="0" b="0"/>
-      </a:effectRef>
-      <a:fontRef idx="minor"/>
-    </dgm:style>
-  </dgm:styleLbl>
-  <dgm:styleLbl name="fgAcc1">
-    <dgm:scene3d>
-      <a:camera prst="orthographicFront"/>
-      <a:lightRig rig="threePt" dir="t"/>
-    </dgm:scene3d>
-    <dgm:sp3d/>
-    <dgm:txPr/>
-    <dgm:style>
-      <a:lnRef idx="2">
-        <a:scrgbClr r="0" g="0" b="0"/>
-      </a:lnRef>
-      <a:fillRef idx="1">
-        <a:scrgbClr r="0" g="0" b="0"/>
-      </a:fillRef>
-      <a:effectRef idx="0">
-        <a:scrgbClr r="0" g="0" b="0"/>
-      </a:effectRef>
-      <a:fontRef idx="minor"/>
-    </dgm:style>
-  </dgm:styleLbl>
-  <dgm:styleLbl name="conFgAcc1">
-    <dgm:scene3d>
-      <a:camera prst="orthographicFront"/>
-      <a:lightRig rig="threePt" dir="t"/>
-    </dgm:scene3d>
-    <dgm:sp3d/>
-    <dgm:txPr/>
-    <dgm:style>
-      <a:lnRef idx="2">
-        <a:scrgbClr r="0" g="0" b="0"/>
-      </a:lnRef>
-      <a:fillRef idx="1">
-        <a:scrgbClr r="0" g="0" b="0"/>
-      </a:fillRef>
-      <a:effectRef idx="0">
-        <a:scrgbClr r="0" g="0" b="0"/>
-      </a:effectRef>
-      <a:fontRef idx="minor"/>
-    </dgm:style>
-  </dgm:styleLbl>
-  <dgm:styleLbl name="alignAcc1">
-    <dgm:scene3d>
-      <a:camera prst="orthographicFront"/>
-      <a:lightRig rig="threePt" dir="t"/>
-    </dgm:scene3d>
-    <dgm:sp3d/>
-    <dgm:txPr/>
-    <dgm:style>
-      <a:lnRef idx="2">
-        <a:scrgbClr r="0" g="0" b="0"/>
-      </a:lnRef>
-      <a:fillRef idx="1">
-        <a:scrgbClr r="0" g="0" b="0"/>
-      </a:fillRef>
-      <a:effectRef idx="0">
-        <a:scrgbClr r="0" g="0" b="0"/>
-      </a:effectRef>
-      <a:fontRef idx="minor"/>
-    </dgm:style>
-  </dgm:styleLbl>
-  <dgm:styleLbl name="trAlignAcc1">
-    <dgm:scene3d>
-      <a:camera prst="orthographicFront"/>
-      <a:lightRig rig="threePt" dir="t"/>
-    </dgm:scene3d>
-    <dgm:sp3d/>
-    <dgm:txPr/>
-    <dgm:style>
-      <a:lnRef idx="1">
-        <a:scrgbClr r="0" g="0" b="0"/>
-      </a:lnRef>
-      <a:fillRef idx="1">
-        <a:scrgbClr r="0" g="0" b="0"/>
-      </a:fillRef>
-      <a:effectRef idx="0">
-        <a:scrgbClr r="0" g="0" b="0"/>
-      </a:effectRef>
-      <a:fontRef idx="minor"/>
-    </dgm:style>
-  </dgm:styleLbl>
-  <dgm:styleLbl name="bgAcc1">
-    <dgm:scene3d>
-      <a:camera prst="orthographicFront"/>
-      <a:lightRig rig="threePt" dir="t"/>
-    </dgm:scene3d>
-    <dgm:sp3d/>
-    <dgm:txPr/>
-    <dgm:style>
-      <a:lnRef idx="2">
-        <a:scrgbClr r="0" g="0" b="0"/>
-      </a:lnRef>
-      <a:fillRef idx="1">
-        <a:scrgbClr r="0" g="0" b="0"/>
-      </a:fillRef>
-      <a:effectRef idx="0">
-        <a:scrgbClr r="0" g="0" b="0"/>
-      </a:effectRef>
-      <a:fontRef idx="minor"/>
-    </dgm:style>
-  </dgm:styleLbl>
-  <dgm:styleLbl name="solidFgAcc1">
-    <dgm:scene3d>
-      <a:camera prst="orthographicFront"/>
-      <a:lightRig rig="threePt" dir="t"/>
-    </dgm:scene3d>
-    <dgm:sp3d/>
-    <dgm:txPr/>
-    <dgm:style>
-      <a:lnRef idx="2">
-        <a:scrgbClr r="0" g="0" b="0"/>
-      </a:lnRef>
-      <a:fillRef idx="1">
-        <a:scrgbClr r="0" g="0" b="0"/>
-      </a:fillRef>
-      <a:effectRef idx="0">
-        <a:scrgbClr r="0" g="0" b="0"/>
-      </a:effectRef>
-      <a:fontRef idx="minor"/>
-    </dgm:style>
-  </dgm:styleLbl>
-  <dgm:styleLbl name="solidAlignAcc1">
-    <dgm:scene3d>
-      <a:camera prst="orthographicFront"/>
-      <a:lightRig rig="threePt" dir="t"/>
-    </dgm:scene3d>
-    <dgm:sp3d/>
-    <dgm:txPr/>
-    <dgm:style>
-      <a:lnRef idx="2">
-        <a:scrgbClr r="0" g="0" b="0"/>
-      </a:lnRef>
-      <a:fillRef idx="1">
-        <a:scrgbClr r="0" g="0" b="0"/>
-      </a:fillRef>
-      <a:effectRef idx="0">
-        <a:scrgbClr r="0" g="0" b="0"/>
-      </a:effectRef>
-      <a:fontRef idx="minor"/>
-    </dgm:style>
-  </dgm:styleLbl>
-  <dgm:styleLbl name="solidBgAcc1">
-    <dgm:scene3d>
-      <a:camera prst="orthographicFront"/>
-      <a:lightRig rig="threePt" dir="t"/>
-    </dgm:scene3d>
-    <dgm:sp3d/>
-    <dgm:txPr/>
-    <dgm:style>
-      <a:lnRef idx="2">
-        <a:scrgbClr r="0" g="0" b="0"/>
-      </a:lnRef>
-      <a:fillRef idx="1">
-        <a:scrgbClr r="0" g="0" b="0"/>
-      </a:fillRef>
-      <a:effectRef idx="0">
-        <a:scrgbClr r="0" g="0" b="0"/>
-      </a:effectRef>
-      <a:fontRef idx="minor"/>
-    </dgm:style>
-  </dgm:styleLbl>
-  <dgm:styleLbl name="fgAccFollowNode1">
-    <dgm:scene3d>
-      <a:camera prst="orthographicFront"/>
-      <a:lightRig rig="threePt" dir="t"/>
-    </dgm:scene3d>
-    <dgm:sp3d/>
-    <dgm:txPr/>
-    <dgm:style>
-      <a:lnRef idx="2">
-        <a:scrgbClr r="0" g="0" b="0"/>
-      </a:lnRef>
-      <a:fillRef idx="1">
-        <a:scrgbClr r="0" g="0" b="0"/>
-      </a:fillRef>
-      <a:effectRef idx="0">
-        <a:scrgbClr r="0" g="0" b="0"/>
-      </a:effectRef>
-      <a:fontRef idx="minor"/>
-    </dgm:style>
-  </dgm:styleLbl>
-  <dgm:styleLbl name="alignAccFollowNode1">
-    <dgm:scene3d>
-      <a:camera prst="orthographicFront"/>
-      <a:lightRig rig="threePt" dir="t"/>
-    </dgm:scene3d>
-    <dgm:sp3d/>
-    <dgm:txPr/>
-    <dgm:style>
-      <a:lnRef idx="2">
-        <a:scrgbClr r="0" g="0" b="0"/>
-      </a:lnRef>
-      <a:fillRef idx="1">
-        <a:scrgbClr r="0" g="0" b="0"/>
-      </a:fillRef>
-      <a:effectRef idx="0">
-        <a:scrgbClr r="0" g="0" b="0"/>
-      </a:effectRef>
-      <a:fontRef idx="minor"/>
-    </dgm:style>
-  </dgm:styleLbl>
-  <dgm:styleLbl name="bgAccFollowNode1">
-    <dgm:scene3d>
-      <a:camera prst="orthographicFront"/>
-      <a:lightRig rig="threePt" dir="t"/>
-    </dgm:scene3d>
-    <dgm:sp3d/>
-    <dgm:txPr/>
-    <dgm:style>
-      <a:lnRef idx="2">
-        <a:scrgbClr r="0" g="0" b="0"/>
-      </a:lnRef>
-      <a:fillRef idx="1">
-        <a:scrgbClr r="0" g="0" b="0"/>
-      </a:fillRef>
-      <a:effectRef idx="0">
-        <a:scrgbClr r="0" g="0" b="0"/>
-      </a:effectRef>
-      <a:fontRef idx="minor"/>
-    </dgm:style>
-  </dgm:styleLbl>
-  <dgm:styleLbl name="fgAcc0">
-    <dgm:scene3d>
-      <a:camera prst="orthographicFront"/>
-      <a:lightRig rig="threePt" dir="t"/>
-    </dgm:scene3d>
-    <dgm:sp3d/>
-    <dgm:txPr/>
-    <dgm:style>
-      <a:lnRef idx="2">
-        <a:scrgbClr r="0" g="0" b="0"/>
-      </a:lnRef>
-      <a:fillRef idx="1">
-        <a:scrgbClr r="0" g="0" b="0"/>
-      </a:fillRef>
-      <a:effectRef idx="0">
-        <a:scrgbClr r="0" g="0" b="0"/>
-      </a:effectRef>
-      <a:fontRef idx="minor"/>
-    </dgm:style>
-  </dgm:styleLbl>
-  <dgm:styleLbl name="fgAcc2">
-    <dgm:scene3d>
-      <a:camera prst="orthographicFront"/>
-      <a:lightRig rig="threePt" dir="t"/>
-    </dgm:scene3d>
-    <dgm:sp3d/>
-    <dgm:txPr/>
-    <dgm:style>
-      <a:lnRef idx="2">
-        <a:scrgbClr r="0" g="0" b="0"/>
-      </a:lnRef>
-      <a:fillRef idx="1">
-        <a:scrgbClr r="0" g="0" b="0"/>
-      </a:fillRef>
-      <a:effectRef idx="0">
-        <a:scrgbClr r="0" g="0" b="0"/>
-      </a:effectRef>
-      <a:fontRef idx="minor"/>
-    </dgm:style>
-  </dgm:styleLbl>
-  <dgm:styleLbl name="fgAcc3">
-    <dgm:scene3d>
-      <a:camera prst="orthographicFront"/>
-      <a:lightRig rig="threePt" dir="t"/>
-    </dgm:scene3d>
-    <dgm:sp3d/>
-    <dgm:txPr/>
-    <dgm:style>
-      <a:lnRef idx="2">
-        <a:scrgbClr r="0" g="0" b="0"/>
-      </a:lnRef>
-      <a:fillRef idx="1">
-        <a:scrgbClr r="0" g="0" b="0"/>
-      </a:fillRef>
-      <a:effectRef idx="0">
-        <a:scrgbClr r="0" g="0" b="0"/>
-      </a:effectRef>
-      <a:fontRef idx="minor"/>
-    </dgm:style>
-  </dgm:styleLbl>
-  <dgm:styleLbl name="fgAcc4">
-    <dgm:scene3d>
-      <a:camera prst="orthographicFront"/>
-      <a:lightRig rig="threePt" dir="t"/>
-    </dgm:scene3d>
-    <dgm:sp3d/>
-    <dgm:txPr/>
-    <dgm:style>
-      <a:lnRef idx="2">
-        <a:scrgbClr r="0" g="0" b="0"/>
-      </a:lnRef>
-      <a:fillRef idx="1">
-        <a:scrgbClr r="0" g="0" b="0"/>
-      </a:fillRef>
-      <a:effectRef idx="0">
-        <a:scrgbClr r="0" g="0" b="0"/>
-      </a:effectRef>
-      <a:fontRef idx="minor"/>
-    </dgm:style>
-  </dgm:styleLbl>
-  <dgm:styleLbl name="bgShp">
-    <dgm:scene3d>
-      <a:camera prst="orthographicFront"/>
-      <a:lightRig rig="threePt" dir="t"/>
-    </dgm:scene3d>
-    <dgm:sp3d/>
-    <dgm:txPr/>
-    <dgm:style>
-      <a:lnRef idx="0">
-        <a:scrgbClr r="0" g="0" b="0"/>
-      </a:lnRef>
-      <a:fillRef idx="1">
-        <a:scrgbClr r="0" g="0" b="0"/>
-      </a:fillRef>
-      <a:effectRef idx="0">
-        <a:scrgbClr r="0" g="0" b="0"/>
-      </a:effectRef>
-      <a:fontRef idx="minor"/>
-    </dgm:style>
-  </dgm:styleLbl>
-  <dgm:styleLbl name="dkBgShp">
-    <dgm:scene3d>
-      <a:camera prst="orthographicFront"/>
-      <a:lightRig rig="threePt" dir="t"/>
-    </dgm:scene3d>
-    <dgm:sp3d/>
-    <dgm:txPr/>
-    <dgm:style>
-      <a:lnRef idx="0">
-        <a:scrgbClr r="0" g="0" b="0"/>
-      </a:lnRef>
-      <a:fillRef idx="1">
-        <a:scrgbClr r="0" g="0" b="0"/>
-      </a:fillRef>
-      <a:effectRef idx="0">
-        <a:scrgbClr r="0" g="0" b="0"/>
-      </a:effectRef>
-      <a:fontRef idx="minor"/>
-    </dgm:style>
-  </dgm:styleLbl>
-  <dgm:styleLbl name="trBgShp">
-    <dgm:scene3d>
-      <a:camera prst="orthographicFront"/>
-      <a:lightRig rig="threePt" dir="t"/>
-    </dgm:scene3d>
-    <dgm:sp3d/>
-    <dgm:txPr/>
-    <dgm:style>
-      <a:lnRef idx="0">
-        <a:scrgbClr r="0" g="0" b="0"/>
-      </a:lnRef>
-      <a:fillRef idx="1">
-        <a:scrgbClr r="0" g="0" b="0"/>
-      </a:fillRef>
-      <a:effectRef idx="0">
-        <a:scrgbClr r="0" g="0" b="0"/>
-      </a:effectRef>
-      <a:fontRef idx="minor"/>
-    </dgm:style>
-  </dgm:styleLbl>
-  <dgm:styleLbl name="fgShp">
-    <dgm:scene3d>
-      <a:camera prst="orthographicFront"/>
-      <a:lightRig rig="threePt" dir="t"/>
-    </dgm:scene3d>
-    <dgm:sp3d/>
-    <dgm:txPr/>
-    <dgm:style>
-      <a:lnRef idx="2">
-        <a:scrgbClr r="0" g="0" b="0"/>
-      </a:lnRef>
-      <a:fillRef idx="1">
-        <a:scrgbClr r="0" g="0" b="0"/>
-      </a:fillRef>
-      <a:effectRef idx="0">
-        <a:scrgbClr r="0" g="0" b="0"/>
-      </a:effectRef>
-      <a:fontRef idx="minor"/>
-    </dgm:style>
-  </dgm:styleLbl>
-  <dgm:styleLbl name="revTx">
-    <dgm:scene3d>
-      <a:camera prst="orthographicFront"/>
-      <a:lightRig rig="threePt" dir="t"/>
-    </dgm:scene3d>
-    <dgm:sp3d/>
-    <dgm:txPr/>
-    <dgm:style>
-      <a:lnRef idx="0">
-        <a:scrgbClr r="0" g="0" b="0"/>
-      </a:lnRef>
-      <a:fillRef idx="0">
-        <a:scrgbClr r="0" g="0" b="0"/>
-      </a:fillRef>
-      <a:effectRef idx="0">
-        <a:scrgbClr r="0" g="0" b="0"/>
-      </a:effectRef>
-      <a:fontRef idx="minor"/>
-    </dgm:style>
-  </dgm:styleLbl>
-</dgm:styleDef>
-</file>
-
-<file path=ppt/diagrams/quickStyle4.xml><?xml version="1.0" encoding="utf-8"?>
 <dgm:styleDef xmlns:dgm="http://schemas.openxmlformats.org/drawingml/2006/diagram" xmlns:a="http://schemas.openxmlformats.org/drawingml/2006/main" uniqueId="urn:microsoft.com/office/officeart/2005/8/quickstyle/simple1">
   <dgm:title val=""/>
   <dgm:desc val=""/>
@@ -12249,7 +9451,7 @@
           <a:p>
             <a:fld id="{1FFC04D8-DA82-4EEF-8918-403B5D7A1786}" type="datetimeFigureOut">
               <a:rPr lang="vi-VN" smtClean="0"/>
-              <a:t>19/08/2021</a:t>
+              <a:t>23/08/2021</a:t>
             </a:fld>
             <a:endParaRPr lang="vi-VN"/>
           </a:p>
@@ -13491,180 +10693,6 @@
 </p:notes>
 </file>
 
-<file path=ppt/notesSlides/notesSlide4.xml><?xml version="1.0" encoding="utf-8"?>
-<p:notes xmlns:a="http://schemas.openxmlformats.org/drawingml/2006/main" xmlns:r="http://schemas.openxmlformats.org/officeDocument/2006/relationships" xmlns:p="http://schemas.openxmlformats.org/presentationml/2006/main">
-  <p:cSld>
-    <p:spTree>
-      <p:nvGrpSpPr>
-        <p:cNvPr id="1" name=""/>
-        <p:cNvGrpSpPr/>
-        <p:nvPr/>
-      </p:nvGrpSpPr>
-      <p:grpSpPr>
-        <a:xfrm>
-          <a:off x="0" y="0"/>
-          <a:ext cx="0" cy="0"/>
-          <a:chOff x="0" y="0"/>
-          <a:chExt cx="0" cy="0"/>
-        </a:xfrm>
-      </p:grpSpPr>
-      <p:sp>
-        <p:nvSpPr>
-          <p:cNvPr id="2" name="Slide Image Placeholder 1"/>
-          <p:cNvSpPr>
-            <a:spLocks noGrp="1" noRot="1" noChangeAspect="1"/>
-          </p:cNvSpPr>
-          <p:nvPr>
-            <p:ph type="sldImg"/>
-          </p:nvPr>
-        </p:nvSpPr>
-        <p:spPr/>
-      </p:sp>
-      <p:sp>
-        <p:nvSpPr>
-          <p:cNvPr id="3" name="Notes Placeholder 2"/>
-          <p:cNvSpPr>
-            <a:spLocks noGrp="1"/>
-          </p:cNvSpPr>
-          <p:nvPr>
-            <p:ph type="body" idx="1"/>
-          </p:nvPr>
-        </p:nvSpPr>
-        <p:spPr/>
-        <p:txBody>
-          <a:bodyPr/>
-          <a:lstStyle/>
-          <a:p>
-            <a:r>
-              <a:rPr lang="vi-VN" dirty="0"/>
-              <a:t>https://www.youtube.com/watch?v=4_SH2nfbQZ8</a:t>
-            </a:r>
-          </a:p>
-        </p:txBody>
-      </p:sp>
-      <p:sp>
-        <p:nvSpPr>
-          <p:cNvPr id="4" name="Slide Number Placeholder 3"/>
-          <p:cNvSpPr>
-            <a:spLocks noGrp="1"/>
-          </p:cNvSpPr>
-          <p:nvPr>
-            <p:ph type="sldNum" sz="quarter" idx="5"/>
-          </p:nvPr>
-        </p:nvSpPr>
-        <p:spPr/>
-        <p:txBody>
-          <a:bodyPr/>
-          <a:lstStyle/>
-          <a:p>
-            <a:fld id="{B5F124B6-917B-466B-9477-75B8F1E462AF}" type="slidenum">
-              <a:rPr lang="vi-VN" smtClean="0"/>
-              <a:t>9</a:t>
-            </a:fld>
-            <a:endParaRPr lang="vi-VN"/>
-          </a:p>
-        </p:txBody>
-      </p:sp>
-    </p:spTree>
-    <p:extLst>
-      <p:ext uri="{BB962C8B-B14F-4D97-AF65-F5344CB8AC3E}">
-        <p14:creationId xmlns:p14="http://schemas.microsoft.com/office/powerpoint/2010/main" val="303314423"/>
-      </p:ext>
-    </p:extLst>
-  </p:cSld>
-  <p:clrMapOvr>
-    <a:masterClrMapping/>
-  </p:clrMapOvr>
-</p:notes>
-</file>
-
-<file path=ppt/notesSlides/notesSlide5.xml><?xml version="1.0" encoding="utf-8"?>
-<p:notes xmlns:a="http://schemas.openxmlformats.org/drawingml/2006/main" xmlns:r="http://schemas.openxmlformats.org/officeDocument/2006/relationships" xmlns:p="http://schemas.openxmlformats.org/presentationml/2006/main">
-  <p:cSld>
-    <p:spTree>
-      <p:nvGrpSpPr>
-        <p:cNvPr id="1" name=""/>
-        <p:cNvGrpSpPr/>
-        <p:nvPr/>
-      </p:nvGrpSpPr>
-      <p:grpSpPr>
-        <a:xfrm>
-          <a:off x="0" y="0"/>
-          <a:ext cx="0" cy="0"/>
-          <a:chOff x="0" y="0"/>
-          <a:chExt cx="0" cy="0"/>
-        </a:xfrm>
-      </p:grpSpPr>
-      <p:sp>
-        <p:nvSpPr>
-          <p:cNvPr id="2" name="Slide Image Placeholder 1"/>
-          <p:cNvSpPr>
-            <a:spLocks noGrp="1" noRot="1" noChangeAspect="1"/>
-          </p:cNvSpPr>
-          <p:nvPr>
-            <p:ph type="sldImg"/>
-          </p:nvPr>
-        </p:nvSpPr>
-        <p:spPr/>
-      </p:sp>
-      <p:sp>
-        <p:nvSpPr>
-          <p:cNvPr id="3" name="Notes Placeholder 2"/>
-          <p:cNvSpPr>
-            <a:spLocks noGrp="1"/>
-          </p:cNvSpPr>
-          <p:nvPr>
-            <p:ph type="body" idx="1"/>
-          </p:nvPr>
-        </p:nvSpPr>
-        <p:spPr/>
-        <p:txBody>
-          <a:bodyPr/>
-          <a:lstStyle/>
-          <a:p>
-            <a:r>
-              <a:rPr lang="vi-VN" dirty="0"/>
-              <a:t>mel-frequency-cepstral-coefficient</a:t>
-            </a:r>
-          </a:p>
-        </p:txBody>
-      </p:sp>
-      <p:sp>
-        <p:nvSpPr>
-          <p:cNvPr id="4" name="Slide Number Placeholder 3"/>
-          <p:cNvSpPr>
-            <a:spLocks noGrp="1"/>
-          </p:cNvSpPr>
-          <p:nvPr>
-            <p:ph type="sldNum" sz="quarter" idx="5"/>
-          </p:nvPr>
-        </p:nvSpPr>
-        <p:spPr/>
-        <p:txBody>
-          <a:bodyPr/>
-          <a:lstStyle/>
-          <a:p>
-            <a:fld id="{B5F124B6-917B-466B-9477-75B8F1E462AF}" type="slidenum">
-              <a:rPr lang="vi-VN" smtClean="0"/>
-              <a:t>10</a:t>
-            </a:fld>
-            <a:endParaRPr lang="vi-VN"/>
-          </a:p>
-        </p:txBody>
-      </p:sp>
-    </p:spTree>
-    <p:extLst>
-      <p:ext uri="{BB962C8B-B14F-4D97-AF65-F5344CB8AC3E}">
-        <p14:creationId xmlns:p14="http://schemas.microsoft.com/office/powerpoint/2010/main" val="650893004"/>
-      </p:ext>
-    </p:extLst>
-  </p:cSld>
-  <p:clrMapOvr>
-    <a:masterClrMapping/>
-  </p:clrMapOvr>
-</p:notes>
-</file>
-
 <file path=ppt/slideLayouts/slideLayout1.xml><?xml version="1.0" encoding="utf-8"?>
 <p:sldLayout xmlns:a="http://schemas.openxmlformats.org/drawingml/2006/main" xmlns:r="http://schemas.openxmlformats.org/officeDocument/2006/relationships" xmlns:p="http://schemas.openxmlformats.org/presentationml/2006/main" type="title" preserve="1">
   <p:cSld name="Title Slide">
@@ -13814,7 +10842,7 @@
           <a:p>
             <a:fld id="{A4083DB6-6D7F-4B98-B411-9A2BEB9706A2}" type="datetimeFigureOut">
               <a:rPr lang="vi-VN" smtClean="0"/>
-              <a:t>19/08/2021</a:t>
+              <a:t>23/08/2021</a:t>
             </a:fld>
             <a:endParaRPr lang="vi-VN"/>
           </a:p>
@@ -14014,7 +11042,7 @@
           <a:p>
             <a:fld id="{A4083DB6-6D7F-4B98-B411-9A2BEB9706A2}" type="datetimeFigureOut">
               <a:rPr lang="vi-VN" smtClean="0"/>
-              <a:t>19/08/2021</a:t>
+              <a:t>23/08/2021</a:t>
             </a:fld>
             <a:endParaRPr lang="vi-VN"/>
           </a:p>
@@ -14224,7 +11252,7 @@
           <a:p>
             <a:fld id="{A4083DB6-6D7F-4B98-B411-9A2BEB9706A2}" type="datetimeFigureOut">
               <a:rPr lang="vi-VN" smtClean="0"/>
-              <a:t>19/08/2021</a:t>
+              <a:t>23/08/2021</a:t>
             </a:fld>
             <a:endParaRPr lang="vi-VN"/>
           </a:p>
@@ -14424,7 +11452,7 @@
           <a:p>
             <a:fld id="{A4083DB6-6D7F-4B98-B411-9A2BEB9706A2}" type="datetimeFigureOut">
               <a:rPr lang="vi-VN" smtClean="0"/>
-              <a:t>19/08/2021</a:t>
+              <a:t>23/08/2021</a:t>
             </a:fld>
             <a:endParaRPr lang="vi-VN"/>
           </a:p>
@@ -14700,7 +11728,7 @@
           <a:p>
             <a:fld id="{A4083DB6-6D7F-4B98-B411-9A2BEB9706A2}" type="datetimeFigureOut">
               <a:rPr lang="vi-VN" smtClean="0"/>
-              <a:t>19/08/2021</a:t>
+              <a:t>23/08/2021</a:t>
             </a:fld>
             <a:endParaRPr lang="vi-VN"/>
           </a:p>
@@ -14968,7 +11996,7 @@
           <a:p>
             <a:fld id="{A4083DB6-6D7F-4B98-B411-9A2BEB9706A2}" type="datetimeFigureOut">
               <a:rPr lang="vi-VN" smtClean="0"/>
-              <a:t>19/08/2021</a:t>
+              <a:t>23/08/2021</a:t>
             </a:fld>
             <a:endParaRPr lang="vi-VN"/>
           </a:p>
@@ -15383,7 +12411,7 @@
           <a:p>
             <a:fld id="{A4083DB6-6D7F-4B98-B411-9A2BEB9706A2}" type="datetimeFigureOut">
               <a:rPr lang="vi-VN" smtClean="0"/>
-              <a:t>19/08/2021</a:t>
+              <a:t>23/08/2021</a:t>
             </a:fld>
             <a:endParaRPr lang="vi-VN"/>
           </a:p>
@@ -15525,7 +12553,7 @@
           <a:p>
             <a:fld id="{A4083DB6-6D7F-4B98-B411-9A2BEB9706A2}" type="datetimeFigureOut">
               <a:rPr lang="vi-VN" smtClean="0"/>
-              <a:t>19/08/2021</a:t>
+              <a:t>23/08/2021</a:t>
             </a:fld>
             <a:endParaRPr lang="vi-VN"/>
           </a:p>
@@ -15638,7 +12666,7 @@
           <a:p>
             <a:fld id="{A4083DB6-6D7F-4B98-B411-9A2BEB9706A2}" type="datetimeFigureOut">
               <a:rPr lang="vi-VN" smtClean="0"/>
-              <a:t>19/08/2021</a:t>
+              <a:t>23/08/2021</a:t>
             </a:fld>
             <a:endParaRPr lang="vi-VN"/>
           </a:p>
@@ -15951,7 +12979,7 @@
           <a:p>
             <a:fld id="{A4083DB6-6D7F-4B98-B411-9A2BEB9706A2}" type="datetimeFigureOut">
               <a:rPr lang="vi-VN" smtClean="0"/>
-              <a:t>19/08/2021</a:t>
+              <a:t>23/08/2021</a:t>
             </a:fld>
             <a:endParaRPr lang="vi-VN"/>
           </a:p>
@@ -16240,7 +13268,7 @@
           <a:p>
             <a:fld id="{A4083DB6-6D7F-4B98-B411-9A2BEB9706A2}" type="datetimeFigureOut">
               <a:rPr lang="vi-VN" smtClean="0"/>
-              <a:t>19/08/2021</a:t>
+              <a:t>23/08/2021</a:t>
             </a:fld>
             <a:endParaRPr lang="vi-VN"/>
           </a:p>
@@ -16483,7 +13511,7 @@
           <a:p>
             <a:fld id="{A4083DB6-6D7F-4B98-B411-9A2BEB9706A2}" type="datetimeFigureOut">
               <a:rPr lang="vi-VN" smtClean="0"/>
-              <a:t>19/08/2021</a:t>
+              <a:t>23/08/2021</a:t>
             </a:fld>
             <a:endParaRPr lang="vi-VN"/>
           </a:p>
@@ -19631,511 +16659,6 @@
       <p:bldP spid="2" grpId="0"/>
     </p:bldLst>
   </p:timing>
-</p:sld>
-</file>
-
-<file path=ppt/slides/slide10.xml><?xml version="1.0" encoding="utf-8"?>
-<p:sld xmlns:a="http://schemas.openxmlformats.org/drawingml/2006/main" xmlns:r="http://schemas.openxmlformats.org/officeDocument/2006/relationships" xmlns:p="http://schemas.openxmlformats.org/presentationml/2006/main" show="0">
-  <p:cSld>
-    <p:bg>
-      <p:bgPr>
-        <a:solidFill>
-          <a:schemeClr val="bg1"/>
-        </a:solidFill>
-        <a:effectLst/>
-      </p:bgPr>
-    </p:bg>
-    <p:spTree>
-      <p:nvGrpSpPr>
-        <p:cNvPr id="1" name=""/>
-        <p:cNvGrpSpPr/>
-        <p:nvPr/>
-      </p:nvGrpSpPr>
-      <p:grpSpPr>
-        <a:xfrm>
-          <a:off x="0" y="0"/>
-          <a:ext cx="0" cy="0"/>
-          <a:chOff x="0" y="0"/>
-          <a:chExt cx="0" cy="0"/>
-        </a:xfrm>
-      </p:grpSpPr>
-      <p:sp useBgFill="1">
-        <p:nvSpPr>
-          <p:cNvPr id="9" name="Rectangle 8">
-            <a:extLst>
-              <a:ext uri="{FF2B5EF4-FFF2-40B4-BE49-F238E27FC236}">
-                <a16:creationId xmlns:a16="http://schemas.microsoft.com/office/drawing/2014/main" id="{56E9B3E6-E277-4D68-BA48-9CB43FFBD6E2}"/>
-              </a:ext>
-              <a:ext uri="{C183D7F6-B498-43B3-948B-1728B52AA6E4}">
-                <adec:decorative xmlns:adec="http://schemas.microsoft.com/office/drawing/2017/decorative" val="1"/>
-              </a:ext>
-            </a:extLst>
-          </p:cNvPr>
-          <p:cNvSpPr>
-            <a:spLocks noGrp="1" noRot="1" noChangeAspect="1" noMove="1" noResize="1" noEditPoints="1" noAdjustHandles="1" noChangeArrowheads="1" noChangeShapeType="1" noTextEdit="1"/>
-          </p:cNvSpPr>
-          <p:nvPr>
-            <p:extLst>
-              <p:ext uri="{386F3935-93C4-4BCD-93E2-E3B085C9AB24}">
-                <p16:designElem xmlns:p16="http://schemas.microsoft.com/office/powerpoint/2015/main" val="1"/>
-              </p:ext>
-            </p:extLst>
-          </p:nvPr>
-        </p:nvSpPr>
-        <p:spPr>
-          <a:xfrm>
-            <a:off x="0" y="0"/>
-            <a:ext cx="12191999" cy="6857365"/>
-          </a:xfrm>
-          <a:prstGeom prst="rect">
-            <a:avLst/>
-          </a:prstGeom>
-          <a:ln>
-            <a:noFill/>
-          </a:ln>
-        </p:spPr>
-        <p:style>
-          <a:lnRef idx="2">
-            <a:schemeClr val="accent1">
-              <a:shade val="50000"/>
-            </a:schemeClr>
-          </a:lnRef>
-          <a:fillRef idx="1">
-            <a:schemeClr val="accent1"/>
-          </a:fillRef>
-          <a:effectRef idx="0">
-            <a:schemeClr val="accent1"/>
-          </a:effectRef>
-          <a:fontRef idx="minor">
-            <a:schemeClr val="lt1"/>
-          </a:fontRef>
-        </p:style>
-        <p:txBody>
-          <a:bodyPr rtlCol="0" anchor="ctr"/>
-          <a:lstStyle/>
-          <a:p>
-            <a:pPr algn="ctr"/>
-            <a:endParaRPr lang="en-US"/>
-          </a:p>
-        </p:txBody>
-      </p:sp>
-      <p:grpSp>
-        <p:nvGrpSpPr>
-          <p:cNvPr id="11" name="Group 10">
-            <a:extLst>
-              <a:ext uri="{FF2B5EF4-FFF2-40B4-BE49-F238E27FC236}">
-                <a16:creationId xmlns:a16="http://schemas.microsoft.com/office/drawing/2014/main" id="{AE1C45F0-260A-458C-96ED-C1F6D2151219}"/>
-              </a:ext>
-              <a:ext uri="{C183D7F6-B498-43B3-948B-1728B52AA6E4}">
-                <adec:decorative xmlns:adec="http://schemas.microsoft.com/office/drawing/2017/decorative" val="1"/>
-              </a:ext>
-            </a:extLst>
-          </p:cNvPr>
-          <p:cNvGrpSpPr>
-            <a:grpSpLocks noGrp="1" noUngrp="1" noRot="1" noChangeAspect="1" noMove="1" noResize="1"/>
-          </p:cNvGrpSpPr>
-          <p:nvPr>
-            <p:extLst>
-              <p:ext uri="{386F3935-93C4-4BCD-93E2-E3B085C9AB24}">
-                <p16:designElem xmlns:p16="http://schemas.microsoft.com/office/powerpoint/2015/main" val="1"/>
-              </p:ext>
-            </p:extLst>
-          </p:nvPr>
-        </p:nvGrpSpPr>
-        <p:grpSpPr>
-          <a:xfrm>
-            <a:off x="4" y="1216597"/>
-            <a:ext cx="731521" cy="673460"/>
-            <a:chOff x="3940602" y="308034"/>
-            <a:chExt cx="2116791" cy="3428999"/>
-          </a:xfrm>
-          <a:solidFill>
-            <a:schemeClr val="accent4"/>
-          </a:solidFill>
-        </p:grpSpPr>
-        <p:sp>
-          <p:nvSpPr>
-            <p:cNvPr id="12" name="Rectangle 11">
-              <a:extLst>
-                <a:ext uri="{FF2B5EF4-FFF2-40B4-BE49-F238E27FC236}">
-                  <a16:creationId xmlns:a16="http://schemas.microsoft.com/office/drawing/2014/main" id="{A6604B49-AD5C-4590-B051-06C8222ECD99}"/>
-                </a:ext>
-                <a:ext uri="{C183D7F6-B498-43B3-948B-1728B52AA6E4}">
-                  <adec:decorative xmlns:adec="http://schemas.microsoft.com/office/drawing/2017/decorative" val="1"/>
-                </a:ext>
-              </a:extLst>
-            </p:cNvPr>
-            <p:cNvSpPr/>
-            <p:nvPr>
-              <p:extLst>
-                <p:ext uri="{386F3935-93C4-4BCD-93E2-E3B085C9AB24}">
-                  <p16:designElem xmlns:p16="http://schemas.microsoft.com/office/powerpoint/2015/main" val="1"/>
-                </p:ext>
-              </p:extLst>
-            </p:nvPr>
-          </p:nvSpPr>
-          <p:spPr>
-            <a:xfrm>
-              <a:off x="3940602" y="308034"/>
-              <a:ext cx="566743" cy="3428999"/>
-            </a:xfrm>
-            <a:prstGeom prst="rect">
-              <a:avLst/>
-            </a:prstGeom>
-            <a:grpFill/>
-            <a:ln>
-              <a:noFill/>
-            </a:ln>
-          </p:spPr>
-          <p:style>
-            <a:lnRef idx="2">
-              <a:schemeClr val="accent1">
-                <a:shade val="50000"/>
-              </a:schemeClr>
-            </a:lnRef>
-            <a:fillRef idx="1">
-              <a:schemeClr val="accent1"/>
-            </a:fillRef>
-            <a:effectRef idx="0">
-              <a:schemeClr val="accent1"/>
-            </a:effectRef>
-            <a:fontRef idx="minor">
-              <a:schemeClr val="lt1"/>
-            </a:fontRef>
-          </p:style>
-          <p:txBody>
-            <a:bodyPr rtlCol="0" anchor="ctr"/>
-            <a:lstStyle/>
-            <a:p>
-              <a:pPr algn="ctr"/>
-              <a:endParaRPr lang="en-US"/>
-            </a:p>
-          </p:txBody>
-        </p:sp>
-        <p:sp>
-          <p:nvSpPr>
-            <p:cNvPr id="13" name="Rectangle 12">
-              <a:extLst>
-                <a:ext uri="{FF2B5EF4-FFF2-40B4-BE49-F238E27FC236}">
-                  <a16:creationId xmlns:a16="http://schemas.microsoft.com/office/drawing/2014/main" id="{743ECCAF-29C5-4537-947C-7EA1292463DB}"/>
-                </a:ext>
-                <a:ext uri="{C183D7F6-B498-43B3-948B-1728B52AA6E4}">
-                  <adec:decorative xmlns:adec="http://schemas.microsoft.com/office/drawing/2017/decorative" val="1"/>
-                </a:ext>
-              </a:extLst>
-            </p:cNvPr>
-            <p:cNvSpPr/>
-            <p:nvPr>
-              <p:extLst>
-                <p:ext uri="{386F3935-93C4-4BCD-93E2-E3B085C9AB24}">
-                  <p16:designElem xmlns:p16="http://schemas.microsoft.com/office/powerpoint/2015/main" val="1"/>
-                </p:ext>
-              </p:extLst>
-            </p:nvPr>
-          </p:nvSpPr>
-          <p:spPr>
-            <a:xfrm>
-              <a:off x="4715626" y="308034"/>
-              <a:ext cx="566743" cy="3428999"/>
-            </a:xfrm>
-            <a:prstGeom prst="rect">
-              <a:avLst/>
-            </a:prstGeom>
-            <a:grpFill/>
-            <a:ln>
-              <a:noFill/>
-            </a:ln>
-          </p:spPr>
-          <p:style>
-            <a:lnRef idx="2">
-              <a:schemeClr val="accent1">
-                <a:shade val="50000"/>
-              </a:schemeClr>
-            </a:lnRef>
-            <a:fillRef idx="1">
-              <a:schemeClr val="accent1"/>
-            </a:fillRef>
-            <a:effectRef idx="0">
-              <a:schemeClr val="accent1"/>
-            </a:effectRef>
-            <a:fontRef idx="minor">
-              <a:schemeClr val="lt1"/>
-            </a:fontRef>
-          </p:style>
-          <p:txBody>
-            <a:bodyPr rtlCol="0" anchor="ctr"/>
-            <a:lstStyle/>
-            <a:p>
-              <a:pPr algn="ctr"/>
-              <a:endParaRPr lang="en-US"/>
-            </a:p>
-          </p:txBody>
-        </p:sp>
-        <p:sp>
-          <p:nvSpPr>
-            <p:cNvPr id="14" name="Rectangle 13">
-              <a:extLst>
-                <a:ext uri="{FF2B5EF4-FFF2-40B4-BE49-F238E27FC236}">
-                  <a16:creationId xmlns:a16="http://schemas.microsoft.com/office/drawing/2014/main" id="{ED49787B-8DE6-4467-AD0A-8DECC6E0C2D6}"/>
-                </a:ext>
-                <a:ext uri="{C183D7F6-B498-43B3-948B-1728B52AA6E4}">
-                  <adec:decorative xmlns:adec="http://schemas.microsoft.com/office/drawing/2017/decorative" val="1"/>
-                </a:ext>
-              </a:extLst>
-            </p:cNvPr>
-            <p:cNvSpPr/>
-            <p:nvPr>
-              <p:extLst>
-                <p:ext uri="{386F3935-93C4-4BCD-93E2-E3B085C9AB24}">
-                  <p16:designElem xmlns:p16="http://schemas.microsoft.com/office/powerpoint/2015/main" val="1"/>
-                </p:ext>
-              </p:extLst>
-            </p:nvPr>
-          </p:nvSpPr>
-          <p:spPr>
-            <a:xfrm>
-              <a:off x="5490650" y="308034"/>
-              <a:ext cx="566743" cy="3428999"/>
-            </a:xfrm>
-            <a:prstGeom prst="rect">
-              <a:avLst/>
-            </a:prstGeom>
-            <a:grpFill/>
-            <a:ln>
-              <a:noFill/>
-            </a:ln>
-          </p:spPr>
-          <p:style>
-            <a:lnRef idx="2">
-              <a:schemeClr val="accent1">
-                <a:shade val="50000"/>
-              </a:schemeClr>
-            </a:lnRef>
-            <a:fillRef idx="1">
-              <a:schemeClr val="accent1"/>
-            </a:fillRef>
-            <a:effectRef idx="0">
-              <a:schemeClr val="accent1"/>
-            </a:effectRef>
-            <a:fontRef idx="minor">
-              <a:schemeClr val="lt1"/>
-            </a:fontRef>
-          </p:style>
-          <p:txBody>
-            <a:bodyPr rtlCol="0" anchor="ctr"/>
-            <a:lstStyle/>
-            <a:p>
-              <a:pPr algn="ctr"/>
-              <a:endParaRPr lang="en-US"/>
-            </a:p>
-          </p:txBody>
-        </p:sp>
-      </p:grpSp>
-      <p:sp>
-        <p:nvSpPr>
-          <p:cNvPr id="16" name="Rectangle 15">
-            <a:extLst>
-              <a:ext uri="{FF2B5EF4-FFF2-40B4-BE49-F238E27FC236}">
-                <a16:creationId xmlns:a16="http://schemas.microsoft.com/office/drawing/2014/main" id="{D5B0017B-2ECA-49AF-B397-DC140825DF8D}"/>
-              </a:ext>
-              <a:ext uri="{C183D7F6-B498-43B3-948B-1728B52AA6E4}">
-                <adec:decorative xmlns:adec="http://schemas.microsoft.com/office/drawing/2017/decorative" val="1"/>
-              </a:ext>
-            </a:extLst>
-          </p:cNvPr>
-          <p:cNvSpPr>
-            <a:spLocks noGrp="1" noRot="1" noChangeAspect="1" noMove="1" noResize="1" noEditPoints="1" noAdjustHandles="1" noChangeArrowheads="1" noChangeShapeType="1" noTextEdit="1"/>
-          </p:cNvSpPr>
-          <p:nvPr>
-            <p:extLst>
-              <p:ext uri="{386F3935-93C4-4BCD-93E2-E3B085C9AB24}">
-                <p16:designElem xmlns:p16="http://schemas.microsoft.com/office/powerpoint/2015/main" val="1"/>
-              </p:ext>
-            </p:extLst>
-          </p:nvPr>
-        </p:nvSpPr>
-        <p:spPr>
-          <a:xfrm>
-            <a:off x="640079" y="613954"/>
-            <a:ext cx="10907487" cy="1894116"/>
-          </a:xfrm>
-          <a:prstGeom prst="rect">
-            <a:avLst/>
-          </a:prstGeom>
-          <a:solidFill>
-            <a:schemeClr val="bg1"/>
-          </a:solidFill>
-          <a:ln>
-            <a:noFill/>
-          </a:ln>
-          <a:effectLst>
-            <a:outerShdw blurRad="139700" dist="127000" dir="5400000" algn="t" rotWithShape="0">
-              <a:prstClr val="black">
-                <a:alpha val="15000"/>
-              </a:prstClr>
-            </a:outerShdw>
-          </a:effectLst>
-        </p:spPr>
-        <p:style>
-          <a:lnRef idx="2">
-            <a:schemeClr val="accent1">
-              <a:shade val="50000"/>
-            </a:schemeClr>
-          </a:lnRef>
-          <a:fillRef idx="1">
-            <a:schemeClr val="accent1"/>
-          </a:fillRef>
-          <a:effectRef idx="0">
-            <a:schemeClr val="accent1"/>
-          </a:effectRef>
-          <a:fontRef idx="minor">
-            <a:schemeClr val="lt1"/>
-          </a:fontRef>
-        </p:style>
-        <p:txBody>
-          <a:bodyPr rtlCol="0" anchor="ctr"/>
-          <a:lstStyle/>
-          <a:p>
-            <a:pPr algn="ctr"/>
-            <a:endParaRPr lang="en-US"/>
-          </a:p>
-        </p:txBody>
-      </p:sp>
-      <p:sp>
-        <p:nvSpPr>
-          <p:cNvPr id="2" name="Title 1">
-            <a:extLst>
-              <a:ext uri="{FF2B5EF4-FFF2-40B4-BE49-F238E27FC236}">
-                <a16:creationId xmlns:a16="http://schemas.microsoft.com/office/drawing/2014/main" id="{61E193C1-7D0E-4C02-85C2-528FEE038787}"/>
-              </a:ext>
-            </a:extLst>
-          </p:cNvPr>
-          <p:cNvSpPr>
-            <a:spLocks noGrp="1"/>
-          </p:cNvSpPr>
-          <p:nvPr>
-            <p:ph type="title"/>
-          </p:nvPr>
-        </p:nvSpPr>
-        <p:spPr>
-          <a:xfrm>
-            <a:off x="1043631" y="809898"/>
-            <a:ext cx="10173010" cy="1554480"/>
-          </a:xfrm>
-        </p:spPr>
-        <p:txBody>
-          <a:bodyPr anchor="ctr">
-            <a:normAutofit/>
-          </a:bodyPr>
-          <a:lstStyle/>
-          <a:p>
-            <a:r>
-              <a:rPr lang="en-US" sz="4800" b="1">
-                <a:latin typeface="Arial" panose="020B0604020202020204" pitchFamily="34" charset="0"/>
-                <a:cs typeface="Arial" panose="020B0604020202020204" pitchFamily="34" charset="0"/>
-              </a:rPr>
-              <a:t>MFCC feature</a:t>
-            </a:r>
-            <a:endParaRPr lang="vi-VN" sz="4800" b="1">
-              <a:latin typeface="Arial" panose="020B0604020202020204" pitchFamily="34" charset="0"/>
-              <a:cs typeface="Arial" panose="020B0604020202020204" pitchFamily="34" charset="0"/>
-            </a:endParaRPr>
-          </a:p>
-        </p:txBody>
-      </p:sp>
-      <p:cxnSp>
-        <p:nvCxnSpPr>
-          <p:cNvPr id="18" name="Straight Connector 17">
-            <a:extLst>
-              <a:ext uri="{FF2B5EF4-FFF2-40B4-BE49-F238E27FC236}">
-                <a16:creationId xmlns:a16="http://schemas.microsoft.com/office/drawing/2014/main" id="{6CF1BAF6-AD41-4082-B212-8A1F9A2E8779}"/>
-              </a:ext>
-              <a:ext uri="{C183D7F6-B498-43B3-948B-1728B52AA6E4}">
-                <adec:decorative xmlns:adec="http://schemas.microsoft.com/office/drawing/2017/decorative" val="1"/>
-              </a:ext>
-            </a:extLst>
-          </p:cNvPr>
-          <p:cNvCxnSpPr>
-            <a:cxnSpLocks noGrp="1" noRot="1" noChangeAspect="1" noMove="1" noResize="1" noEditPoints="1" noAdjustHandles="1" noChangeArrowheads="1" noChangeShapeType="1"/>
-          </p:cNvCxnSpPr>
-          <p:nvPr>
-            <p:extLst>
-              <p:ext uri="{386F3935-93C4-4BCD-93E2-E3B085C9AB24}">
-                <p16:designElem xmlns:p16="http://schemas.microsoft.com/office/powerpoint/2015/main" val="1"/>
-              </p:ext>
-            </p:extLst>
-          </p:nvPr>
-        </p:nvCxnSpPr>
-        <p:spPr>
-          <a:xfrm flipH="1">
-            <a:off x="838200" y="6485313"/>
-            <a:ext cx="10515600" cy="0"/>
-          </a:xfrm>
-          <a:prstGeom prst="line">
-            <a:avLst/>
-          </a:prstGeom>
-          <a:ln w="57150">
-            <a:solidFill>
-              <a:schemeClr val="accent4"/>
-            </a:solidFill>
-          </a:ln>
-        </p:spPr>
-        <p:style>
-          <a:lnRef idx="1">
-            <a:schemeClr val="accent1"/>
-          </a:lnRef>
-          <a:fillRef idx="0">
-            <a:schemeClr val="accent1"/>
-          </a:fillRef>
-          <a:effectRef idx="0">
-            <a:schemeClr val="accent1"/>
-          </a:effectRef>
-          <a:fontRef idx="minor">
-            <a:schemeClr val="tx1"/>
-          </a:fontRef>
-        </p:style>
-      </p:cxnSp>
-      <p:graphicFrame>
-        <p:nvGraphicFramePr>
-          <p:cNvPr id="5" name="Content Placeholder 2">
-            <a:extLst>
-              <a:ext uri="{FF2B5EF4-FFF2-40B4-BE49-F238E27FC236}">
-                <a16:creationId xmlns:a16="http://schemas.microsoft.com/office/drawing/2014/main" id="{D1ED3C83-8878-4115-9163-34AB46B96826}"/>
-              </a:ext>
-            </a:extLst>
-          </p:cNvPr>
-          <p:cNvGraphicFramePr>
-            <a:graphicFrameLocks noGrp="1"/>
-          </p:cNvGraphicFramePr>
-          <p:nvPr>
-            <p:ph idx="1"/>
-            <p:extLst>
-              <p:ext uri="{D42A27DB-BD31-4B8C-83A1-F6EECF244321}">
-                <p14:modId xmlns:p14="http://schemas.microsoft.com/office/powerpoint/2010/main" val="2931627846"/>
-              </p:ext>
-            </p:extLst>
-          </p:nvPr>
-        </p:nvGraphicFramePr>
-        <p:xfrm>
-          <a:off x="904602" y="3017519"/>
-          <a:ext cx="10378440" cy="3209902"/>
-        </p:xfrm>
-        <a:graphic>
-          <a:graphicData uri="http://schemas.openxmlformats.org/drawingml/2006/diagram">
-            <dgm:relIds xmlns:dgm="http://schemas.openxmlformats.org/drawingml/2006/diagram" xmlns:r="http://schemas.openxmlformats.org/officeDocument/2006/relationships" r:dm="rId3" r:lo="rId4" r:qs="rId5" r:cs="rId6"/>
-          </a:graphicData>
-        </a:graphic>
-      </p:graphicFrame>
-    </p:spTree>
-    <p:extLst>
-      <p:ext uri="{BB962C8B-B14F-4D97-AF65-F5344CB8AC3E}">
-        <p14:creationId xmlns:p14="http://schemas.microsoft.com/office/powerpoint/2010/main" val="2914426177"/>
-      </p:ext>
-    </p:extLst>
-  </p:cSld>
-  <p:clrMapOvr>
-    <a:masterClrMapping/>
-  </p:clrMapOvr>
 </p:sld>
 </file>
 
@@ -23667,116 +20190,6 @@
 </p:sld>
 </file>
 
-<file path=ppt/slides/slide9.xml><?xml version="1.0" encoding="utf-8"?>
-<p:sld xmlns:a="http://schemas.openxmlformats.org/drawingml/2006/main" xmlns:r="http://schemas.openxmlformats.org/officeDocument/2006/relationships" xmlns:p="http://schemas.openxmlformats.org/presentationml/2006/main" show="0">
-  <p:cSld>
-    <p:spTree>
-      <p:nvGrpSpPr>
-        <p:cNvPr id="1" name=""/>
-        <p:cNvGrpSpPr/>
-        <p:nvPr/>
-      </p:nvGrpSpPr>
-      <p:grpSpPr>
-        <a:xfrm>
-          <a:off x="0" y="0"/>
-          <a:ext cx="0" cy="0"/>
-          <a:chOff x="0" y="0"/>
-          <a:chExt cx="0" cy="0"/>
-        </a:xfrm>
-      </p:grpSpPr>
-      <p:sp>
-        <p:nvSpPr>
-          <p:cNvPr id="2" name="Title 1">
-            <a:extLst>
-              <a:ext uri="{FF2B5EF4-FFF2-40B4-BE49-F238E27FC236}">
-                <a16:creationId xmlns:a16="http://schemas.microsoft.com/office/drawing/2014/main" id="{C57D04F6-ED95-449A-90DD-052E120A93FE}"/>
-              </a:ext>
-            </a:extLst>
-          </p:cNvPr>
-          <p:cNvSpPr>
-            <a:spLocks noGrp="1"/>
-          </p:cNvSpPr>
-          <p:nvPr>
-            <p:ph type="title"/>
-          </p:nvPr>
-        </p:nvSpPr>
-        <p:spPr/>
-        <p:txBody>
-          <a:bodyPr/>
-          <a:lstStyle/>
-          <a:p>
-            <a:endParaRPr lang="vi-VN"/>
-          </a:p>
-        </p:txBody>
-      </p:sp>
-      <p:sp>
-        <p:nvSpPr>
-          <p:cNvPr id="3" name="Content Placeholder 2">
-            <a:extLst>
-              <a:ext uri="{FF2B5EF4-FFF2-40B4-BE49-F238E27FC236}">
-                <a16:creationId xmlns:a16="http://schemas.microsoft.com/office/drawing/2014/main" id="{6D83FEB2-8667-41DF-BFF5-ECD16C0B7789}"/>
-              </a:ext>
-            </a:extLst>
-          </p:cNvPr>
-          <p:cNvSpPr>
-            <a:spLocks noGrp="1"/>
-          </p:cNvSpPr>
-          <p:nvPr>
-            <p:ph idx="1"/>
-          </p:nvPr>
-        </p:nvSpPr>
-        <p:spPr/>
-        <p:txBody>
-          <a:bodyPr/>
-          <a:lstStyle/>
-          <a:p>
-            <a:endParaRPr lang="vi-VN"/>
-          </a:p>
-        </p:txBody>
-      </p:sp>
-      <p:pic>
-        <p:nvPicPr>
-          <p:cNvPr id="5" name="Picture 4" descr="Graphical user interface, text, application, email&#10;&#10;Description automatically generated">
-            <a:extLst>
-              <a:ext uri="{FF2B5EF4-FFF2-40B4-BE49-F238E27FC236}">
-                <a16:creationId xmlns:a16="http://schemas.microsoft.com/office/drawing/2014/main" id="{F9456F6E-DA61-4C1C-AF1A-4ED674B85768}"/>
-              </a:ext>
-            </a:extLst>
-          </p:cNvPr>
-          <p:cNvPicPr>
-            <a:picLocks noChangeAspect="1"/>
-          </p:cNvPicPr>
-          <p:nvPr/>
-        </p:nvPicPr>
-        <p:blipFill>
-          <a:blip r:embed="rId3"/>
-          <a:stretch>
-            <a:fillRect/>
-          </a:stretch>
-        </p:blipFill>
-        <p:spPr>
-          <a:xfrm>
-            <a:off x="390525" y="752475"/>
-            <a:ext cx="11410950" cy="5353050"/>
-          </a:xfrm>
-          <a:prstGeom prst="rect">
-            <a:avLst/>
-          </a:prstGeom>
-        </p:spPr>
-      </p:pic>
-    </p:spTree>
-    <p:extLst>
-      <p:ext uri="{BB962C8B-B14F-4D97-AF65-F5344CB8AC3E}">
-        <p14:creationId xmlns:p14="http://schemas.microsoft.com/office/powerpoint/2010/main" val="2996294044"/>
-      </p:ext>
-    </p:extLst>
-  </p:cSld>
-  <p:clrMapOvr>
-    <a:masterClrMapping/>
-  </p:clrMapOvr>
-</p:sld>
-</file>
-
 <file path=ppt/theme/theme1.xml><?xml version="1.0" encoding="utf-8"?>
 <a:theme xmlns:a="http://schemas.openxmlformats.org/drawingml/2006/main" name="Office Theme">
   <a:themeElements>

</xml_diff>